<commit_message>
Update hồ sơ tkpm khách tham qan
</commit_message>
<xml_diff>
--- a/Ho_so_PTTKPM/1688035_TKPM_Khach_Tham_quan.pptx
+++ b/Ho_so_PTTKPM/1688035_TKPM_Khach_Tham_quan.pptx
@@ -5,12 +5,16 @@
     <p:sldMasterId id="2147483648" r:id="rId1"/>
   </p:sldMasterIdLst>
   <p:notesMasterIdLst>
-    <p:notesMasterId r:id="rId6"/>
+    <p:notesMasterId r:id="rId8"/>
   </p:notesMasterIdLst>
   <p:sldIdLst>
     <p:sldId id="256" r:id="rId3"/>
     <p:sldId id="258" r:id="rId4"/>
-    <p:sldId id="257" r:id="rId5"/>
+    <p:sldId id="259" r:id="rId5"/>
+    <p:sldId id="260" r:id="rId6"/>
+    <p:sldId id="257" r:id="rId7"/>
+    <p:sldId id="261" r:id="rId9"/>
+    <p:sldId id="262" r:id="rId10"/>
   </p:sldIdLst>
   <p:sldSz cx="12192000" cy="6858000"/>
   <p:notesSz cx="7103745" cy="10234295"/>
@@ -460,6 +464,92 @@
 </file>
 
 <file path=ppt/notesSlides/notesSlide1.xml><?xml version="1.0" encoding="utf-8"?>
+<p:notes xmlns:a="http://schemas.openxmlformats.org/drawingml/2006/main" xmlns:r="http://schemas.openxmlformats.org/officeDocument/2006/relationships" xmlns:p="http://schemas.openxmlformats.org/presentationml/2006/main">
+  <p:cSld>
+    <p:spTree>
+      <p:nvGrpSpPr>
+        <p:cNvPr id="1" name=""/>
+        <p:cNvGrpSpPr/>
+        <p:nvPr/>
+      </p:nvGrpSpPr>
+      <p:grpSpPr>
+        <a:xfrm>
+          <a:off x="0" y="0"/>
+          <a:ext cx="0" cy="0"/>
+          <a:chOff x="0" y="0"/>
+          <a:chExt cx="0" cy="0"/>
+        </a:xfrm>
+      </p:grpSpPr>
+      <p:sp>
+        <p:nvSpPr>
+          <p:cNvPr id="2" name="Slide Image Placeholder 1"/>
+          <p:cNvSpPr>
+            <a:spLocks noGrp="1" noRot="1" noChangeAspect="1"/>
+          </p:cNvSpPr>
+          <p:nvPr>
+            <p:ph type="sldImg"/>
+          </p:nvPr>
+        </p:nvSpPr>
+        <p:spPr/>
+      </p:sp>
+      <p:sp>
+        <p:nvSpPr>
+          <p:cNvPr id="3" name="Notes Placeholder 2"/>
+          <p:cNvSpPr>
+            <a:spLocks noGrp="1"/>
+          </p:cNvSpPr>
+          <p:nvPr>
+            <p:ph type="body" idx="1"/>
+          </p:nvPr>
+        </p:nvSpPr>
+        <p:spPr/>
+        <p:txBody>
+          <a:bodyPr/>
+          <a:lstStyle/>
+          <a:p>
+            <a:endParaRPr lang="en-US"/>
+          </a:p>
+        </p:txBody>
+      </p:sp>
+      <p:sp>
+        <p:nvSpPr>
+          <p:cNvPr id="4" name="Slide Number Placeholder 3"/>
+          <p:cNvSpPr>
+            <a:spLocks noGrp="1"/>
+          </p:cNvSpPr>
+          <p:nvPr>
+            <p:ph type="sldNum" sz="quarter" idx="10"/>
+          </p:nvPr>
+        </p:nvSpPr>
+        <p:spPr/>
+        <p:txBody>
+          <a:bodyPr/>
+          <a:lstStyle/>
+          <a:p>
+            <a:fld id="{1C6F55E1-8FA1-4431-8CCD-46EFB1EBE07A}" type="slidenum">
+              <a:rPr lang="vi-VN" smtClean="0">
+                <a:solidFill>
+                  <a:prstClr val="black"/>
+                </a:solidFill>
+              </a:rPr>
+            </a:fld>
+            <a:endParaRPr lang="vi-VN">
+              <a:solidFill>
+                <a:prstClr val="black"/>
+              </a:solidFill>
+            </a:endParaRPr>
+          </a:p>
+        </p:txBody>
+      </p:sp>
+    </p:spTree>
+  </p:cSld>
+  <p:clrMapOvr>
+    <a:masterClrMapping/>
+  </p:clrMapOvr>
+</p:notes>
+</file>
+
+<file path=ppt/notesSlides/notesSlide2.xml><?xml version="1.0" encoding="utf-8"?>
 <p:notes xmlns:a="http://schemas.openxmlformats.org/drawingml/2006/main" xmlns:r="http://schemas.openxmlformats.org/officeDocument/2006/relationships" xmlns:p="http://schemas.openxmlformats.org/presentationml/2006/main">
   <p:cSld>
     <p:spTree>
@@ -3879,7 +3969,7 @@
         <p:spPr>
           <a:xfrm>
             <a:off x="527685" y="1338580"/>
-            <a:ext cx="3691255" cy="368300"/>
+            <a:ext cx="6848475" cy="368300"/>
           </a:xfrm>
           <a:prstGeom prst="rect">
             <a:avLst/>
@@ -3893,7 +3983,7 @@
           <a:p>
             <a:r>
               <a:rPr lang="en-US"/>
-              <a:t>Màn hình chính</a:t>
+              <a:t>Màn hình chọn suất chiếu và chi tiết phim</a:t>
             </a:r>
             <a:endParaRPr lang="en-US"/>
           </a:p>
@@ -3907,7 +3997,7 @@
         </p:nvSpPr>
         <p:spPr>
           <a:xfrm>
-            <a:off x="279400" y="1891665"/>
+            <a:off x="279400" y="1882775"/>
             <a:ext cx="11633835" cy="4775200"/>
           </a:xfrm>
           <a:prstGeom prst="rect">
@@ -4100,6 +4190,11 @@
             <a:avLst/>
           </a:prstGeom>
           <a:noFill/>
+          <a:ln>
+            <a:solidFill>
+              <a:schemeClr val="tx1"/>
+            </a:solidFill>
+          </a:ln>
         </p:spPr>
         <p:txBody>
           <a:bodyPr wrap="square" rtlCol="0">
@@ -4158,6 +4253,11 @@
             <a:avLst/>
           </a:prstGeom>
           <a:noFill/>
+          <a:ln>
+            <a:solidFill>
+              <a:schemeClr val="tx1"/>
+            </a:solidFill>
+          </a:ln>
         </p:spPr>
         <p:txBody>
           <a:bodyPr wrap="square" rtlCol="0">
@@ -4180,13 +4280,18 @@
         </p:nvSpPr>
         <p:spPr>
           <a:xfrm>
-            <a:off x="2486025" y="4364990"/>
+            <a:off x="2390775" y="4364990"/>
             <a:ext cx="1195070" cy="368300"/>
           </a:xfrm>
           <a:prstGeom prst="rect">
             <a:avLst/>
           </a:prstGeom>
           <a:noFill/>
+          <a:ln>
+            <a:solidFill>
+              <a:schemeClr val="tx1"/>
+            </a:solidFill>
+          </a:ln>
         </p:spPr>
         <p:txBody>
           <a:bodyPr wrap="square" rtlCol="0">
@@ -4216,6 +4321,11 @@
             <a:avLst/>
           </a:prstGeom>
           <a:noFill/>
+          <a:ln>
+            <a:solidFill>
+              <a:schemeClr val="tx1"/>
+            </a:solidFill>
+          </a:ln>
         </p:spPr>
         <p:txBody>
           <a:bodyPr wrap="square" rtlCol="0">
@@ -4225,6 +4335,169 @@
             <a:r>
               <a:rPr lang="en-US"/>
               <a:t>Suất chiếu</a:t>
+            </a:r>
+            <a:endParaRPr lang="en-US"/>
+          </a:p>
+        </p:txBody>
+      </p:sp>
+      <p:sp>
+        <p:nvSpPr>
+          <p:cNvPr id="83" name="Rectangle 82"/>
+          <p:cNvSpPr/>
+          <p:nvPr/>
+        </p:nvSpPr>
+        <p:spPr>
+          <a:xfrm>
+            <a:off x="776605" y="4818380"/>
+            <a:ext cx="2729230" cy="1697355"/>
+          </a:xfrm>
+          <a:prstGeom prst="rect">
+            <a:avLst/>
+          </a:prstGeom>
+          <a:noFill/>
+          <a:extLst>
+            <a:ext uri="{909E8E84-426E-40DD-AFC4-6F175D3DCCD1}">
+              <a14:hiddenFill xmlns:a14="http://schemas.microsoft.com/office/drawing/2010/main">
+                <a:solidFill>
+                  <a:schemeClr val="accent2"/>
+                </a:solidFill>
+              </a14:hiddenFill>
+            </a:ext>
+          </a:extLst>
+        </p:spPr>
+        <p:style>
+          <a:lnRef idx="2">
+            <a:schemeClr val="accent1">
+              <a:shade val="50000"/>
+            </a:schemeClr>
+          </a:lnRef>
+          <a:fillRef idx="1">
+            <a:schemeClr val="accent1"/>
+          </a:fillRef>
+          <a:effectRef idx="0">
+            <a:schemeClr val="accent1"/>
+          </a:effectRef>
+          <a:fontRef idx="minor">
+            <a:schemeClr val="lt1"/>
+          </a:fontRef>
+        </p:style>
+        <p:txBody>
+          <a:bodyPr rtlCol="0" anchor="ctr"/>
+          <a:p>
+            <a:pPr algn="ctr"/>
+            <a:r>
+              <a:rPr lang="en-US">
+                <a:solidFill>
+                  <a:schemeClr val="tx1"/>
+                </a:solidFill>
+              </a:rPr>
+              <a:t>Poster Phim</a:t>
+            </a:r>
+            <a:endParaRPr lang="en-US">
+              <a:solidFill>
+                <a:schemeClr val="tx1"/>
+              </a:solidFill>
+            </a:endParaRPr>
+          </a:p>
+        </p:txBody>
+      </p:sp>
+      <p:sp>
+        <p:nvSpPr>
+          <p:cNvPr id="84" name="Text Box 83"/>
+          <p:cNvSpPr txBox="1"/>
+          <p:nvPr/>
+        </p:nvSpPr>
+        <p:spPr>
+          <a:xfrm>
+            <a:off x="4555490" y="4863465"/>
+            <a:ext cx="5511165" cy="1476375"/>
+          </a:xfrm>
+          <a:prstGeom prst="rect">
+            <a:avLst/>
+          </a:prstGeom>
+          <a:noFill/>
+        </p:spPr>
+        <p:txBody>
+          <a:bodyPr wrap="square" rtlCol="0">
+            <a:spAutoFit/>
+          </a:bodyPr>
+          <a:p>
+            <a:r>
+              <a:rPr lang="en-US"/>
+              <a:t>Thông tin chi tiết của phim</a:t>
+            </a:r>
+            <a:endParaRPr lang="en-US"/>
+          </a:p>
+          <a:p>
+            <a:pPr marL="285750" indent="-285750">
+              <a:buFont typeface="Arial" panose="020B0604020202020204" pitchFamily="34" charset="0"/>
+              <a:buChar char="•"/>
+            </a:pPr>
+            <a:r>
+              <a:rPr lang="en-US"/>
+              <a:t>Tên phim</a:t>
+            </a:r>
+            <a:endParaRPr lang="en-US"/>
+          </a:p>
+          <a:p>
+            <a:pPr marL="285750" indent="-285750">
+              <a:buFont typeface="Arial" panose="020B0604020202020204" pitchFamily="34" charset="0"/>
+              <a:buChar char="•"/>
+            </a:pPr>
+            <a:r>
+              <a:rPr lang="en-US"/>
+              <a:t>Giá vé</a:t>
+            </a:r>
+            <a:endParaRPr lang="en-US"/>
+          </a:p>
+          <a:p>
+            <a:pPr marL="285750" indent="-285750">
+              <a:buFont typeface="Arial" panose="020B0604020202020204" pitchFamily="34" charset="0"/>
+              <a:buChar char="•"/>
+            </a:pPr>
+            <a:r>
+              <a:rPr lang="en-US"/>
+              <a:t>Tên diễn viên</a:t>
+            </a:r>
+            <a:endParaRPr lang="en-US"/>
+          </a:p>
+          <a:p>
+            <a:pPr marL="285750" indent="-285750">
+              <a:buFont typeface="Arial" panose="020B0604020202020204" pitchFamily="34" charset="0"/>
+              <a:buChar char="•"/>
+            </a:pPr>
+            <a:r>
+              <a:rPr lang="en-US"/>
+              <a:t>...</a:t>
+            </a:r>
+            <a:endParaRPr lang="en-US"/>
+          </a:p>
+        </p:txBody>
+      </p:sp>
+      <p:sp>
+        <p:nvSpPr>
+          <p:cNvPr id="86" name="Text Box 85"/>
+          <p:cNvSpPr txBox="1"/>
+          <p:nvPr/>
+        </p:nvSpPr>
+        <p:spPr>
+          <a:xfrm>
+            <a:off x="7766050" y="3442335"/>
+            <a:ext cx="2623820" cy="1198880"/>
+          </a:xfrm>
+          <a:prstGeom prst="rect">
+            <a:avLst/>
+          </a:prstGeom>
+          <a:noFill/>
+        </p:spPr>
+        <p:txBody>
+          <a:bodyPr wrap="square" rtlCol="0">
+            <a:spAutoFit/>
+          </a:bodyPr>
+          <a:p>
+            <a:r>
+              <a:rPr lang="en-US"/>
+              <a:t>Suất chiếu tự động hiện khi chọn ngày, click suất chiếu để chọn và chuyển sang trang chọn ghế</a:t>
             </a:r>
             <a:endParaRPr lang="en-US"/>
           </a:p>
@@ -4247,14 +4520,7 @@
         <p:cNvGrpSpPr/>
         <p:nvPr/>
       </p:nvGrpSpPr>
-      <p:grpSpPr>
-        <a:xfrm>
-          <a:off x="0" y="0"/>
-          <a:ext cx="0" cy="0"/>
-          <a:chOff x="0" y="0"/>
-          <a:chExt cx="0" cy="0"/>
-        </a:xfrm>
-      </p:grpSpPr>
+      <p:grpSpPr/>
       <p:sp>
         <p:nvSpPr>
           <p:cNvPr id="69" name="Rounded Rectangle 68">
@@ -4312,7 +4578,6 @@
         </p:style>
         <p:txBody>
           <a:bodyPr rtlCol="0" anchor="ctr"/>
-          <a:lstStyle/>
           <a:p>
             <a:pPr algn="ctr"/>
             <a:r>
@@ -4378,7 +4643,7 @@
                 <a:cs typeface="Arial" panose="020B0604020202020204" pitchFamily="34" charset="0"/>
                 <a:sym typeface="+mn-ea"/>
               </a:rPr>
-              <a:t>Mô hình Đối tượng xử lý của Phân hệ Khách tham quan  </a:t>
+              <a:t>1-Giao diện  </a:t>
             </a:r>
             <a:endParaRPr lang="vi-VN" sz="1600">
               <a:solidFill>
@@ -4392,68 +4657,2585 @@
       </p:sp>
       <p:sp>
         <p:nvSpPr>
-          <p:cNvPr id="70" name="Footer Placeholder 2"/>
-          <p:cNvSpPr>
-            <a:spLocks noGrp="1"/>
-          </p:cNvSpPr>
-          <p:nvPr>
-            <p:ph type="ftr" sz="quarter" idx="11"/>
-          </p:nvPr>
-        </p:nvSpPr>
-        <p:spPr>
-          <a:xfrm>
-            <a:off x="4446324" y="5354536"/>
-            <a:ext cx="3273554" cy="365125"/>
-          </a:xfrm>
-        </p:spPr>
-        <p:txBody>
-          <a:bodyPr/>
-          <a:lstStyle/>
-          <a:p>
-            <a:pPr>
-              <a:defRPr/>
-            </a:pPr>
-            <a:r>
-              <a:rPr lang="vi-VN" sz="1600">
-                <a:solidFill>
-                  <a:srgbClr val="002060"/>
+          <p:cNvPr id="4" name="Text Box 3"/>
+          <p:cNvSpPr txBox="1"/>
+          <p:nvPr/>
+        </p:nvSpPr>
+        <p:spPr>
+          <a:xfrm>
+            <a:off x="527685" y="1338580"/>
+            <a:ext cx="6848475" cy="368300"/>
+          </a:xfrm>
+          <a:prstGeom prst="rect">
+            <a:avLst/>
+          </a:prstGeom>
+          <a:noFill/>
+        </p:spPr>
+        <p:txBody>
+          <a:bodyPr wrap="square" rtlCol="0">
+            <a:spAutoFit/>
+          </a:bodyPr>
+          <a:p>
+            <a:r>
+              <a:rPr lang="en-US"/>
+              <a:t>Màn hình chọn ghế</a:t>
+            </a:r>
+            <a:endParaRPr lang="en-US"/>
+          </a:p>
+        </p:txBody>
+      </p:sp>
+      <p:sp>
+        <p:nvSpPr>
+          <p:cNvPr id="50" name="Rectangle 49"/>
+          <p:cNvSpPr/>
+          <p:nvPr/>
+        </p:nvSpPr>
+        <p:spPr>
+          <a:xfrm>
+            <a:off x="279400" y="1822450"/>
+            <a:ext cx="11633835" cy="4614545"/>
+          </a:xfrm>
+          <a:prstGeom prst="rect">
+            <a:avLst/>
+          </a:prstGeom>
+          <a:solidFill>
+            <a:schemeClr val="bg1"/>
+          </a:solidFill>
+        </p:spPr>
+        <p:style>
+          <a:lnRef idx="2">
+            <a:schemeClr val="accent1">
+              <a:shade val="50000"/>
+            </a:schemeClr>
+          </a:lnRef>
+          <a:fillRef idx="1">
+            <a:schemeClr val="accent1"/>
+          </a:fillRef>
+          <a:effectRef idx="0">
+            <a:schemeClr val="accent1"/>
+          </a:effectRef>
+          <a:fontRef idx="minor">
+            <a:schemeClr val="lt1"/>
+          </a:fontRef>
+        </p:style>
+        <p:txBody>
+          <a:bodyPr rtlCol="0" anchor="ctr"/>
+          <a:p>
+            <a:pPr algn="ctr"/>
+            <a:endParaRPr lang="en-US"/>
+          </a:p>
+        </p:txBody>
+      </p:sp>
+      <p:sp>
+        <p:nvSpPr>
+          <p:cNvPr id="52" name="Text Box 51"/>
+          <p:cNvSpPr txBox="1"/>
+          <p:nvPr/>
+        </p:nvSpPr>
+        <p:spPr>
+          <a:xfrm>
+            <a:off x="2781300" y="1995170"/>
+            <a:ext cx="5104130" cy="368300"/>
+          </a:xfrm>
+          <a:prstGeom prst="rect">
+            <a:avLst/>
+          </a:prstGeom>
+          <a:noFill/>
+          <a:ln>
+            <a:solidFill>
+              <a:schemeClr val="tx1"/>
+            </a:solidFill>
+          </a:ln>
+        </p:spPr>
+        <p:txBody>
+          <a:bodyPr wrap="square" rtlCol="0">
+            <a:spAutoFit/>
+          </a:bodyPr>
+          <a:p>
+            <a:r>
+              <a:rPr lang="en-US"/>
+              <a:t>Khung tìm kiếm phim</a:t>
+            </a:r>
+            <a:endParaRPr lang="en-US"/>
+          </a:p>
+        </p:txBody>
+      </p:sp>
+      <p:sp>
+        <p:nvSpPr>
+          <p:cNvPr id="53" name="Text Box 52"/>
+          <p:cNvSpPr txBox="1"/>
+          <p:nvPr/>
+        </p:nvSpPr>
+        <p:spPr>
+          <a:xfrm>
+            <a:off x="677545" y="1995170"/>
+            <a:ext cx="977265" cy="368300"/>
+          </a:xfrm>
+          <a:prstGeom prst="rect">
+            <a:avLst/>
+          </a:prstGeom>
+          <a:noFill/>
+          <a:ln>
+            <a:solidFill>
+              <a:schemeClr val="tx1"/>
+            </a:solidFill>
+          </a:ln>
+        </p:spPr>
+        <p:txBody>
+          <a:bodyPr wrap="square" rtlCol="0">
+            <a:spAutoFit/>
+          </a:bodyPr>
+          <a:p>
+            <a:r>
+              <a:rPr lang="en-US"/>
+              <a:t>Logo</a:t>
+            </a:r>
+            <a:endParaRPr lang="en-US"/>
+          </a:p>
+        </p:txBody>
+      </p:sp>
+      <p:sp>
+        <p:nvSpPr>
+          <p:cNvPr id="97" name="Rectangle 96"/>
+          <p:cNvSpPr/>
+          <p:nvPr/>
+        </p:nvSpPr>
+        <p:spPr>
+          <a:xfrm>
+            <a:off x="279400" y="2503805"/>
+            <a:ext cx="11633835" cy="548640"/>
+          </a:xfrm>
+          <a:prstGeom prst="rect">
+            <a:avLst/>
+          </a:prstGeom>
+          <a:solidFill>
+            <a:schemeClr val="bg2"/>
+          </a:solidFill>
+        </p:spPr>
+        <p:style>
+          <a:lnRef idx="2">
+            <a:schemeClr val="accent1">
+              <a:shade val="50000"/>
+            </a:schemeClr>
+          </a:lnRef>
+          <a:fillRef idx="1">
+            <a:schemeClr val="accent1"/>
+          </a:fillRef>
+          <a:effectRef idx="0">
+            <a:schemeClr val="accent1"/>
+          </a:effectRef>
+          <a:fontRef idx="minor">
+            <a:schemeClr val="lt1"/>
+          </a:fontRef>
+        </p:style>
+        <p:txBody>
+          <a:bodyPr rtlCol="0" anchor="ctr"/>
+          <a:p>
+            <a:pPr algn="ctr"/>
+            <a:endParaRPr lang="en-US"/>
+          </a:p>
+        </p:txBody>
+      </p:sp>
+      <p:sp>
+        <p:nvSpPr>
+          <p:cNvPr id="3" name="Rectangle 2"/>
+          <p:cNvSpPr/>
+          <p:nvPr/>
+        </p:nvSpPr>
+        <p:spPr>
+          <a:xfrm>
+            <a:off x="2123440" y="3323590"/>
+            <a:ext cx="3936365" cy="2982595"/>
+          </a:xfrm>
+          <a:prstGeom prst="rect">
+            <a:avLst/>
+          </a:prstGeom>
+          <a:noFill/>
+          <a:extLst>
+            <a:ext uri="{909E8E84-426E-40DD-AFC4-6F175D3DCCD1}">
+              <a14:hiddenFill xmlns:a14="http://schemas.microsoft.com/office/drawing/2010/main">
+                <a:solidFill>
+                  <a:schemeClr val="accent1"/>
+                </a:solidFill>
+              </a14:hiddenFill>
+            </a:ext>
+          </a:extLst>
+        </p:spPr>
+        <p:style>
+          <a:lnRef idx="2">
+            <a:schemeClr val="accent1">
+              <a:shade val="50000"/>
+            </a:schemeClr>
+          </a:lnRef>
+          <a:fillRef idx="1">
+            <a:schemeClr val="accent1"/>
+          </a:fillRef>
+          <a:effectRef idx="0">
+            <a:schemeClr val="accent1"/>
+          </a:effectRef>
+          <a:fontRef idx="minor">
+            <a:schemeClr val="lt1"/>
+          </a:fontRef>
+        </p:style>
+        <p:txBody>
+          <a:bodyPr rtlCol="0" anchor="ctr"/>
+          <a:p>
+            <a:pPr algn="ctr"/>
+            <a:endParaRPr lang="en-US"/>
+          </a:p>
+        </p:txBody>
+      </p:sp>
+      <p:sp>
+        <p:nvSpPr>
+          <p:cNvPr id="5" name="Rectangle 4"/>
+          <p:cNvSpPr/>
+          <p:nvPr/>
+        </p:nvSpPr>
+        <p:spPr>
+          <a:xfrm>
+            <a:off x="2324735" y="3445510"/>
+            <a:ext cx="245110" cy="237490"/>
+          </a:xfrm>
+          <a:prstGeom prst="rect">
+            <a:avLst/>
+          </a:prstGeom>
+          <a:noFill/>
+          <a:extLst>
+            <a:ext uri="{909E8E84-426E-40DD-AFC4-6F175D3DCCD1}">
+              <a14:hiddenFill xmlns:a14="http://schemas.microsoft.com/office/drawing/2010/main">
+                <a:solidFill>
+                  <a:schemeClr val="accent1"/>
+                </a:solidFill>
+              </a14:hiddenFill>
+            </a:ext>
+          </a:extLst>
+        </p:spPr>
+        <p:style>
+          <a:lnRef idx="2">
+            <a:schemeClr val="accent1">
+              <a:shade val="50000"/>
+            </a:schemeClr>
+          </a:lnRef>
+          <a:fillRef idx="1">
+            <a:schemeClr val="accent1"/>
+          </a:fillRef>
+          <a:effectRef idx="0">
+            <a:schemeClr val="accent1"/>
+          </a:effectRef>
+          <a:fontRef idx="minor">
+            <a:schemeClr val="lt1"/>
+          </a:fontRef>
+        </p:style>
+        <p:txBody>
+          <a:bodyPr rtlCol="0" anchor="ctr"/>
+          <a:p>
+            <a:pPr algn="ctr"/>
+            <a:r>
+              <a:rPr lang="en-US" sz="1200">
+                <a:solidFill>
+                  <a:schemeClr val="tx1"/>
+                </a:solidFill>
+              </a:rPr>
+              <a:t>1</a:t>
+            </a:r>
+            <a:endParaRPr lang="en-US" sz="1200">
+              <a:solidFill>
+                <a:schemeClr val="tx1"/>
+              </a:solidFill>
+            </a:endParaRPr>
+          </a:p>
+        </p:txBody>
+      </p:sp>
+      <p:sp>
+        <p:nvSpPr>
+          <p:cNvPr id="6" name="Rectangle 5"/>
+          <p:cNvSpPr/>
+          <p:nvPr/>
+        </p:nvSpPr>
+        <p:spPr>
+          <a:xfrm>
+            <a:off x="2844800" y="3445510"/>
+            <a:ext cx="245110" cy="237490"/>
+          </a:xfrm>
+          <a:prstGeom prst="rect">
+            <a:avLst/>
+          </a:prstGeom>
+          <a:noFill/>
+          <a:extLst>
+            <a:ext uri="{909E8E84-426E-40DD-AFC4-6F175D3DCCD1}">
+              <a14:hiddenFill xmlns:a14="http://schemas.microsoft.com/office/drawing/2010/main">
+                <a:solidFill>
+                  <a:schemeClr val="accent1"/>
+                </a:solidFill>
+              </a14:hiddenFill>
+            </a:ext>
+          </a:extLst>
+        </p:spPr>
+        <p:style>
+          <a:lnRef idx="2">
+            <a:schemeClr val="accent1">
+              <a:shade val="50000"/>
+            </a:schemeClr>
+          </a:lnRef>
+          <a:fillRef idx="1">
+            <a:schemeClr val="accent1"/>
+          </a:fillRef>
+          <a:effectRef idx="0">
+            <a:schemeClr val="accent1"/>
+          </a:effectRef>
+          <a:fontRef idx="minor">
+            <a:schemeClr val="lt1"/>
+          </a:fontRef>
+        </p:style>
+        <p:txBody>
+          <a:bodyPr rtlCol="0" anchor="ctr"/>
+          <a:p>
+            <a:pPr algn="ctr"/>
+            <a:r>
+              <a:rPr lang="en-US" sz="1200">
+                <a:solidFill>
+                  <a:schemeClr val="tx1"/>
+                </a:solidFill>
+              </a:rPr>
+              <a:t>2</a:t>
+            </a:r>
+            <a:endParaRPr lang="en-US" sz="1200">
+              <a:solidFill>
+                <a:schemeClr val="tx1"/>
+              </a:solidFill>
+            </a:endParaRPr>
+          </a:p>
+        </p:txBody>
+      </p:sp>
+      <p:sp>
+        <p:nvSpPr>
+          <p:cNvPr id="7" name="Rectangle 6"/>
+          <p:cNvSpPr/>
+          <p:nvPr/>
+        </p:nvSpPr>
+        <p:spPr>
+          <a:xfrm>
+            <a:off x="3404870" y="3445510"/>
+            <a:ext cx="245110" cy="237490"/>
+          </a:xfrm>
+          <a:prstGeom prst="rect">
+            <a:avLst/>
+          </a:prstGeom>
+          <a:noFill/>
+          <a:extLst>
+            <a:ext uri="{909E8E84-426E-40DD-AFC4-6F175D3DCCD1}">
+              <a14:hiddenFill xmlns:a14="http://schemas.microsoft.com/office/drawing/2010/main">
+                <a:solidFill>
+                  <a:schemeClr val="accent1"/>
+                </a:solidFill>
+              </a14:hiddenFill>
+            </a:ext>
+          </a:extLst>
+        </p:spPr>
+        <p:style>
+          <a:lnRef idx="2">
+            <a:schemeClr val="accent1">
+              <a:shade val="50000"/>
+            </a:schemeClr>
+          </a:lnRef>
+          <a:fillRef idx="1">
+            <a:schemeClr val="accent1"/>
+          </a:fillRef>
+          <a:effectRef idx="0">
+            <a:schemeClr val="accent1"/>
+          </a:effectRef>
+          <a:fontRef idx="minor">
+            <a:schemeClr val="lt1"/>
+          </a:fontRef>
+        </p:style>
+        <p:txBody>
+          <a:bodyPr rtlCol="0" anchor="ctr"/>
+          <a:p>
+            <a:pPr algn="ctr"/>
+            <a:r>
+              <a:rPr lang="en-US" sz="1200">
+                <a:solidFill>
+                  <a:schemeClr val="tx1"/>
+                </a:solidFill>
+              </a:rPr>
+              <a:t>3</a:t>
+            </a:r>
+            <a:endParaRPr lang="en-US" sz="1200">
+              <a:solidFill>
+                <a:schemeClr val="tx1"/>
+              </a:solidFill>
+            </a:endParaRPr>
+          </a:p>
+        </p:txBody>
+      </p:sp>
+      <p:sp>
+        <p:nvSpPr>
+          <p:cNvPr id="8" name="Rectangle 7"/>
+          <p:cNvSpPr/>
+          <p:nvPr/>
+        </p:nvSpPr>
+        <p:spPr>
+          <a:xfrm>
+            <a:off x="3885565" y="3445510"/>
+            <a:ext cx="245110" cy="237490"/>
+          </a:xfrm>
+          <a:prstGeom prst="rect">
+            <a:avLst/>
+          </a:prstGeom>
+          <a:noFill/>
+          <a:extLst>
+            <a:ext uri="{909E8E84-426E-40DD-AFC4-6F175D3DCCD1}">
+              <a14:hiddenFill xmlns:a14="http://schemas.microsoft.com/office/drawing/2010/main">
+                <a:solidFill>
+                  <a:schemeClr val="accent1"/>
+                </a:solidFill>
+              </a14:hiddenFill>
+            </a:ext>
+          </a:extLst>
+        </p:spPr>
+        <p:style>
+          <a:lnRef idx="2">
+            <a:schemeClr val="accent1">
+              <a:shade val="50000"/>
+            </a:schemeClr>
+          </a:lnRef>
+          <a:fillRef idx="1">
+            <a:schemeClr val="accent1"/>
+          </a:fillRef>
+          <a:effectRef idx="0">
+            <a:schemeClr val="accent1"/>
+          </a:effectRef>
+          <a:fontRef idx="minor">
+            <a:schemeClr val="lt1"/>
+          </a:fontRef>
+        </p:style>
+        <p:txBody>
+          <a:bodyPr rtlCol="0" anchor="ctr"/>
+          <a:p>
+            <a:pPr algn="ctr"/>
+            <a:r>
+              <a:rPr lang="en-US" sz="1200">
+                <a:solidFill>
+                  <a:schemeClr val="tx1"/>
+                </a:solidFill>
+              </a:rPr>
+              <a:t>4</a:t>
+            </a:r>
+            <a:endParaRPr lang="en-US" sz="1200">
+              <a:solidFill>
+                <a:schemeClr val="tx1"/>
+              </a:solidFill>
+            </a:endParaRPr>
+          </a:p>
+        </p:txBody>
+      </p:sp>
+      <p:sp>
+        <p:nvSpPr>
+          <p:cNvPr id="9" name="Rectangle 8"/>
+          <p:cNvSpPr/>
+          <p:nvPr/>
+        </p:nvSpPr>
+        <p:spPr>
+          <a:xfrm>
+            <a:off x="4454525" y="3445510"/>
+            <a:ext cx="245110" cy="237490"/>
+          </a:xfrm>
+          <a:prstGeom prst="rect">
+            <a:avLst/>
+          </a:prstGeom>
+          <a:noFill/>
+          <a:extLst>
+            <a:ext uri="{909E8E84-426E-40DD-AFC4-6F175D3DCCD1}">
+              <a14:hiddenFill xmlns:a14="http://schemas.microsoft.com/office/drawing/2010/main">
+                <a:solidFill>
+                  <a:schemeClr val="accent1"/>
+                </a:solidFill>
+              </a14:hiddenFill>
+            </a:ext>
+          </a:extLst>
+        </p:spPr>
+        <p:style>
+          <a:lnRef idx="2">
+            <a:schemeClr val="accent1">
+              <a:shade val="50000"/>
+            </a:schemeClr>
+          </a:lnRef>
+          <a:fillRef idx="1">
+            <a:schemeClr val="accent1"/>
+          </a:fillRef>
+          <a:effectRef idx="0">
+            <a:schemeClr val="accent1"/>
+          </a:effectRef>
+          <a:fontRef idx="minor">
+            <a:schemeClr val="lt1"/>
+          </a:fontRef>
+        </p:style>
+        <p:txBody>
+          <a:bodyPr rtlCol="0" anchor="ctr"/>
+          <a:p>
+            <a:pPr algn="ctr"/>
+            <a:r>
+              <a:rPr lang="en-US" sz="1200">
+                <a:solidFill>
+                  <a:schemeClr val="tx1"/>
+                </a:solidFill>
+              </a:rPr>
+              <a:t>5</a:t>
+            </a:r>
+            <a:endParaRPr lang="en-US" sz="1200">
+              <a:solidFill>
+                <a:schemeClr val="tx1"/>
+              </a:solidFill>
+            </a:endParaRPr>
+          </a:p>
+        </p:txBody>
+      </p:sp>
+      <p:sp>
+        <p:nvSpPr>
+          <p:cNvPr id="10" name="Rectangle 9"/>
+          <p:cNvSpPr/>
+          <p:nvPr/>
+        </p:nvSpPr>
+        <p:spPr>
+          <a:xfrm>
+            <a:off x="4987925" y="3445510"/>
+            <a:ext cx="245110" cy="237490"/>
+          </a:xfrm>
+          <a:prstGeom prst="rect">
+            <a:avLst/>
+          </a:prstGeom>
+          <a:noFill/>
+          <a:extLst>
+            <a:ext uri="{909E8E84-426E-40DD-AFC4-6F175D3DCCD1}">
+              <a14:hiddenFill xmlns:a14="http://schemas.microsoft.com/office/drawing/2010/main">
+                <a:solidFill>
+                  <a:schemeClr val="accent1"/>
+                </a:solidFill>
+              </a14:hiddenFill>
+            </a:ext>
+          </a:extLst>
+        </p:spPr>
+        <p:style>
+          <a:lnRef idx="2">
+            <a:schemeClr val="accent1">
+              <a:shade val="50000"/>
+            </a:schemeClr>
+          </a:lnRef>
+          <a:fillRef idx="1">
+            <a:schemeClr val="accent1"/>
+          </a:fillRef>
+          <a:effectRef idx="0">
+            <a:schemeClr val="accent1"/>
+          </a:effectRef>
+          <a:fontRef idx="minor">
+            <a:schemeClr val="lt1"/>
+          </a:fontRef>
+        </p:style>
+        <p:txBody>
+          <a:bodyPr rtlCol="0" anchor="ctr"/>
+          <a:p>
+            <a:pPr algn="ctr"/>
+            <a:r>
+              <a:rPr lang="en-US" sz="1200">
+                <a:solidFill>
+                  <a:schemeClr val="tx1"/>
+                </a:solidFill>
+              </a:rPr>
+              <a:t>6</a:t>
+            </a:r>
+            <a:endParaRPr lang="en-US" sz="1200">
+              <a:solidFill>
+                <a:schemeClr val="tx1"/>
+              </a:solidFill>
+            </a:endParaRPr>
+          </a:p>
+        </p:txBody>
+      </p:sp>
+      <p:sp>
+        <p:nvSpPr>
+          <p:cNvPr id="11" name="Rectangle 10"/>
+          <p:cNvSpPr/>
+          <p:nvPr/>
+        </p:nvSpPr>
+        <p:spPr>
+          <a:xfrm>
+            <a:off x="5368290" y="3445510"/>
+            <a:ext cx="245110" cy="237490"/>
+          </a:xfrm>
+          <a:prstGeom prst="rect">
+            <a:avLst/>
+          </a:prstGeom>
+          <a:noFill/>
+          <a:extLst>
+            <a:ext uri="{909E8E84-426E-40DD-AFC4-6F175D3DCCD1}">
+              <a14:hiddenFill xmlns:a14="http://schemas.microsoft.com/office/drawing/2010/main">
+                <a:solidFill>
+                  <a:schemeClr val="accent1"/>
+                </a:solidFill>
+              </a14:hiddenFill>
+            </a:ext>
+          </a:extLst>
+        </p:spPr>
+        <p:style>
+          <a:lnRef idx="2">
+            <a:schemeClr val="accent1">
+              <a:shade val="50000"/>
+            </a:schemeClr>
+          </a:lnRef>
+          <a:fillRef idx="1">
+            <a:schemeClr val="accent1"/>
+          </a:fillRef>
+          <a:effectRef idx="0">
+            <a:schemeClr val="accent1"/>
+          </a:effectRef>
+          <a:fontRef idx="minor">
+            <a:schemeClr val="lt1"/>
+          </a:fontRef>
+        </p:style>
+        <p:txBody>
+          <a:bodyPr rtlCol="0" anchor="ctr"/>
+          <a:p>
+            <a:pPr algn="ctr"/>
+            <a:r>
+              <a:rPr lang="en-US" sz="1200">
+                <a:solidFill>
+                  <a:schemeClr val="tx1"/>
+                </a:solidFill>
+              </a:rPr>
+              <a:t>7</a:t>
+            </a:r>
+            <a:endParaRPr lang="en-US" sz="1200">
+              <a:solidFill>
+                <a:schemeClr val="tx1"/>
+              </a:solidFill>
+            </a:endParaRPr>
+          </a:p>
+        </p:txBody>
+      </p:sp>
+      <p:sp>
+        <p:nvSpPr>
+          <p:cNvPr id="166" name="Rectangle 165"/>
+          <p:cNvSpPr/>
+          <p:nvPr/>
+        </p:nvSpPr>
+        <p:spPr>
+          <a:xfrm>
+            <a:off x="2324735" y="3852545"/>
+            <a:ext cx="245110" cy="237490"/>
+          </a:xfrm>
+          <a:prstGeom prst="rect">
+            <a:avLst/>
+          </a:prstGeom>
+          <a:noFill/>
+          <a:extLst>
+            <a:ext uri="{909E8E84-426E-40DD-AFC4-6F175D3DCCD1}">
+              <a14:hiddenFill xmlns:a14="http://schemas.microsoft.com/office/drawing/2010/main">
+                <a:solidFill>
+                  <a:schemeClr val="accent1"/>
+                </a:solidFill>
+              </a14:hiddenFill>
+            </a:ext>
+          </a:extLst>
+        </p:spPr>
+        <p:style>
+          <a:lnRef idx="2">
+            <a:schemeClr val="accent1">
+              <a:shade val="50000"/>
+            </a:schemeClr>
+          </a:lnRef>
+          <a:fillRef idx="1">
+            <a:schemeClr val="accent1"/>
+          </a:fillRef>
+          <a:effectRef idx="0">
+            <a:schemeClr val="accent1"/>
+          </a:effectRef>
+          <a:fontRef idx="minor">
+            <a:schemeClr val="lt1"/>
+          </a:fontRef>
+        </p:style>
+        <p:txBody>
+          <a:bodyPr rtlCol="0" anchor="ctr"/>
+          <a:p>
+            <a:pPr algn="ctr"/>
+            <a:r>
+              <a:rPr lang="en-US" sz="1200">
+                <a:solidFill>
+                  <a:schemeClr val="tx1"/>
+                </a:solidFill>
+              </a:rPr>
+              <a:t>1</a:t>
+            </a:r>
+            <a:endParaRPr lang="en-US" sz="1200">
+              <a:solidFill>
+                <a:schemeClr val="tx1"/>
+              </a:solidFill>
+            </a:endParaRPr>
+          </a:p>
+        </p:txBody>
+      </p:sp>
+      <p:sp>
+        <p:nvSpPr>
+          <p:cNvPr id="167" name="Rectangle 166"/>
+          <p:cNvSpPr/>
+          <p:nvPr/>
+        </p:nvSpPr>
+        <p:spPr>
+          <a:xfrm>
+            <a:off x="2844800" y="3852545"/>
+            <a:ext cx="245110" cy="237490"/>
+          </a:xfrm>
+          <a:prstGeom prst="rect">
+            <a:avLst/>
+          </a:prstGeom>
+          <a:noFill/>
+          <a:extLst>
+            <a:ext uri="{909E8E84-426E-40DD-AFC4-6F175D3DCCD1}">
+              <a14:hiddenFill xmlns:a14="http://schemas.microsoft.com/office/drawing/2010/main">
+                <a:solidFill>
+                  <a:schemeClr val="accent1"/>
+                </a:solidFill>
+              </a14:hiddenFill>
+            </a:ext>
+          </a:extLst>
+        </p:spPr>
+        <p:style>
+          <a:lnRef idx="2">
+            <a:schemeClr val="accent1">
+              <a:shade val="50000"/>
+            </a:schemeClr>
+          </a:lnRef>
+          <a:fillRef idx="1">
+            <a:schemeClr val="accent1"/>
+          </a:fillRef>
+          <a:effectRef idx="0">
+            <a:schemeClr val="accent1"/>
+          </a:effectRef>
+          <a:fontRef idx="minor">
+            <a:schemeClr val="lt1"/>
+          </a:fontRef>
+        </p:style>
+        <p:txBody>
+          <a:bodyPr rtlCol="0" anchor="ctr"/>
+          <a:p>
+            <a:pPr algn="ctr"/>
+            <a:r>
+              <a:rPr lang="en-US" sz="1200">
+                <a:solidFill>
+                  <a:schemeClr val="tx1"/>
+                </a:solidFill>
+              </a:rPr>
+              <a:t>2</a:t>
+            </a:r>
+            <a:endParaRPr lang="en-US" sz="1200">
+              <a:solidFill>
+                <a:schemeClr val="tx1"/>
+              </a:solidFill>
+            </a:endParaRPr>
+          </a:p>
+        </p:txBody>
+      </p:sp>
+      <p:sp>
+        <p:nvSpPr>
+          <p:cNvPr id="168" name="Rectangle 167"/>
+          <p:cNvSpPr/>
+          <p:nvPr/>
+        </p:nvSpPr>
+        <p:spPr>
+          <a:xfrm>
+            <a:off x="3404870" y="3852545"/>
+            <a:ext cx="245110" cy="237490"/>
+          </a:xfrm>
+          <a:prstGeom prst="rect">
+            <a:avLst/>
+          </a:prstGeom>
+          <a:noFill/>
+          <a:extLst>
+            <a:ext uri="{909E8E84-426E-40DD-AFC4-6F175D3DCCD1}">
+              <a14:hiddenFill xmlns:a14="http://schemas.microsoft.com/office/drawing/2010/main">
+                <a:solidFill>
+                  <a:schemeClr val="accent1"/>
+                </a:solidFill>
+              </a14:hiddenFill>
+            </a:ext>
+          </a:extLst>
+        </p:spPr>
+        <p:style>
+          <a:lnRef idx="2">
+            <a:schemeClr val="accent1">
+              <a:shade val="50000"/>
+            </a:schemeClr>
+          </a:lnRef>
+          <a:fillRef idx="1">
+            <a:schemeClr val="accent1"/>
+          </a:fillRef>
+          <a:effectRef idx="0">
+            <a:schemeClr val="accent1"/>
+          </a:effectRef>
+          <a:fontRef idx="minor">
+            <a:schemeClr val="lt1"/>
+          </a:fontRef>
+        </p:style>
+        <p:txBody>
+          <a:bodyPr rtlCol="0" anchor="ctr"/>
+          <a:p>
+            <a:pPr algn="ctr"/>
+            <a:r>
+              <a:rPr lang="en-US" sz="1200">
+                <a:solidFill>
+                  <a:schemeClr val="tx1"/>
+                </a:solidFill>
+              </a:rPr>
+              <a:t>3</a:t>
+            </a:r>
+            <a:endParaRPr lang="en-US" sz="1200">
+              <a:solidFill>
+                <a:schemeClr val="tx1"/>
+              </a:solidFill>
+            </a:endParaRPr>
+          </a:p>
+        </p:txBody>
+      </p:sp>
+      <p:sp>
+        <p:nvSpPr>
+          <p:cNvPr id="169" name="Rectangle 168"/>
+          <p:cNvSpPr/>
+          <p:nvPr/>
+        </p:nvSpPr>
+        <p:spPr>
+          <a:xfrm>
+            <a:off x="3885565" y="3852545"/>
+            <a:ext cx="245110" cy="237490"/>
+          </a:xfrm>
+          <a:prstGeom prst="rect">
+            <a:avLst/>
+          </a:prstGeom>
+          <a:noFill/>
+          <a:extLst>
+            <a:ext uri="{909E8E84-426E-40DD-AFC4-6F175D3DCCD1}">
+              <a14:hiddenFill xmlns:a14="http://schemas.microsoft.com/office/drawing/2010/main">
+                <a:solidFill>
+                  <a:schemeClr val="accent1"/>
+                </a:solidFill>
+              </a14:hiddenFill>
+            </a:ext>
+          </a:extLst>
+        </p:spPr>
+        <p:style>
+          <a:lnRef idx="2">
+            <a:schemeClr val="accent1">
+              <a:shade val="50000"/>
+            </a:schemeClr>
+          </a:lnRef>
+          <a:fillRef idx="1">
+            <a:schemeClr val="accent1"/>
+          </a:fillRef>
+          <a:effectRef idx="0">
+            <a:schemeClr val="accent1"/>
+          </a:effectRef>
+          <a:fontRef idx="minor">
+            <a:schemeClr val="lt1"/>
+          </a:fontRef>
+        </p:style>
+        <p:txBody>
+          <a:bodyPr rtlCol="0" anchor="ctr"/>
+          <a:p>
+            <a:pPr algn="ctr"/>
+            <a:r>
+              <a:rPr lang="en-US" sz="1200">
+                <a:solidFill>
+                  <a:schemeClr val="tx1"/>
+                </a:solidFill>
+              </a:rPr>
+              <a:t>4</a:t>
+            </a:r>
+            <a:endParaRPr lang="en-US" sz="1200">
+              <a:solidFill>
+                <a:schemeClr val="tx1"/>
+              </a:solidFill>
+            </a:endParaRPr>
+          </a:p>
+        </p:txBody>
+      </p:sp>
+      <p:sp>
+        <p:nvSpPr>
+          <p:cNvPr id="170" name="Rectangle 169"/>
+          <p:cNvSpPr/>
+          <p:nvPr/>
+        </p:nvSpPr>
+        <p:spPr>
+          <a:xfrm>
+            <a:off x="4454525" y="3852545"/>
+            <a:ext cx="245110" cy="237490"/>
+          </a:xfrm>
+          <a:prstGeom prst="rect">
+            <a:avLst/>
+          </a:prstGeom>
+          <a:noFill/>
+          <a:extLst>
+            <a:ext uri="{909E8E84-426E-40DD-AFC4-6F175D3DCCD1}">
+              <a14:hiddenFill xmlns:a14="http://schemas.microsoft.com/office/drawing/2010/main">
+                <a:solidFill>
+                  <a:schemeClr val="accent1"/>
+                </a:solidFill>
+              </a14:hiddenFill>
+            </a:ext>
+          </a:extLst>
+        </p:spPr>
+        <p:style>
+          <a:lnRef idx="2">
+            <a:schemeClr val="accent1">
+              <a:shade val="50000"/>
+            </a:schemeClr>
+          </a:lnRef>
+          <a:fillRef idx="1">
+            <a:schemeClr val="accent1"/>
+          </a:fillRef>
+          <a:effectRef idx="0">
+            <a:schemeClr val="accent1"/>
+          </a:effectRef>
+          <a:fontRef idx="minor">
+            <a:schemeClr val="lt1"/>
+          </a:fontRef>
+        </p:style>
+        <p:txBody>
+          <a:bodyPr rtlCol="0" anchor="ctr"/>
+          <a:p>
+            <a:pPr algn="ctr"/>
+            <a:r>
+              <a:rPr lang="en-US" sz="1200">
+                <a:solidFill>
+                  <a:schemeClr val="tx1"/>
+                </a:solidFill>
+              </a:rPr>
+              <a:t>5</a:t>
+            </a:r>
+            <a:endParaRPr lang="en-US" sz="1200">
+              <a:solidFill>
+                <a:schemeClr val="tx1"/>
+              </a:solidFill>
+            </a:endParaRPr>
+          </a:p>
+        </p:txBody>
+      </p:sp>
+      <p:sp>
+        <p:nvSpPr>
+          <p:cNvPr id="171" name="Rectangle 170"/>
+          <p:cNvSpPr/>
+          <p:nvPr/>
+        </p:nvSpPr>
+        <p:spPr>
+          <a:xfrm>
+            <a:off x="4987925" y="3852545"/>
+            <a:ext cx="245110" cy="237490"/>
+          </a:xfrm>
+          <a:prstGeom prst="rect">
+            <a:avLst/>
+          </a:prstGeom>
+          <a:noFill/>
+          <a:extLst>
+            <a:ext uri="{909E8E84-426E-40DD-AFC4-6F175D3DCCD1}">
+              <a14:hiddenFill xmlns:a14="http://schemas.microsoft.com/office/drawing/2010/main">
+                <a:solidFill>
+                  <a:schemeClr val="accent1"/>
+                </a:solidFill>
+              </a14:hiddenFill>
+            </a:ext>
+          </a:extLst>
+        </p:spPr>
+        <p:style>
+          <a:lnRef idx="2">
+            <a:schemeClr val="accent1">
+              <a:shade val="50000"/>
+            </a:schemeClr>
+          </a:lnRef>
+          <a:fillRef idx="1">
+            <a:schemeClr val="accent1"/>
+          </a:fillRef>
+          <a:effectRef idx="0">
+            <a:schemeClr val="accent1"/>
+          </a:effectRef>
+          <a:fontRef idx="minor">
+            <a:schemeClr val="lt1"/>
+          </a:fontRef>
+        </p:style>
+        <p:txBody>
+          <a:bodyPr rtlCol="0" anchor="ctr"/>
+          <a:p>
+            <a:pPr algn="ctr"/>
+            <a:r>
+              <a:rPr lang="en-US" sz="1200">
+                <a:solidFill>
+                  <a:schemeClr val="tx1"/>
+                </a:solidFill>
+              </a:rPr>
+              <a:t>6</a:t>
+            </a:r>
+            <a:endParaRPr lang="en-US" sz="1200">
+              <a:solidFill>
+                <a:schemeClr val="tx1"/>
+              </a:solidFill>
+            </a:endParaRPr>
+          </a:p>
+        </p:txBody>
+      </p:sp>
+      <p:sp>
+        <p:nvSpPr>
+          <p:cNvPr id="172" name="Rectangle 171"/>
+          <p:cNvSpPr/>
+          <p:nvPr/>
+        </p:nvSpPr>
+        <p:spPr>
+          <a:xfrm>
+            <a:off x="5368290" y="3852545"/>
+            <a:ext cx="245110" cy="237490"/>
+          </a:xfrm>
+          <a:prstGeom prst="rect">
+            <a:avLst/>
+          </a:prstGeom>
+          <a:noFill/>
+          <a:extLst>
+            <a:ext uri="{909E8E84-426E-40DD-AFC4-6F175D3DCCD1}">
+              <a14:hiddenFill xmlns:a14="http://schemas.microsoft.com/office/drawing/2010/main">
+                <a:solidFill>
+                  <a:schemeClr val="accent1"/>
+                </a:solidFill>
+              </a14:hiddenFill>
+            </a:ext>
+          </a:extLst>
+        </p:spPr>
+        <p:style>
+          <a:lnRef idx="2">
+            <a:schemeClr val="accent1">
+              <a:shade val="50000"/>
+            </a:schemeClr>
+          </a:lnRef>
+          <a:fillRef idx="1">
+            <a:schemeClr val="accent1"/>
+          </a:fillRef>
+          <a:effectRef idx="0">
+            <a:schemeClr val="accent1"/>
+          </a:effectRef>
+          <a:fontRef idx="minor">
+            <a:schemeClr val="lt1"/>
+          </a:fontRef>
+        </p:style>
+        <p:txBody>
+          <a:bodyPr rtlCol="0" anchor="ctr"/>
+          <a:p>
+            <a:pPr algn="ctr"/>
+            <a:r>
+              <a:rPr lang="en-US" sz="1200">
+                <a:solidFill>
+                  <a:schemeClr val="tx1"/>
+                </a:solidFill>
+              </a:rPr>
+              <a:t>7</a:t>
+            </a:r>
+            <a:endParaRPr lang="en-US" sz="1200">
+              <a:solidFill>
+                <a:schemeClr val="tx1"/>
+              </a:solidFill>
+            </a:endParaRPr>
+          </a:p>
+        </p:txBody>
+      </p:sp>
+      <p:sp>
+        <p:nvSpPr>
+          <p:cNvPr id="173" name="Text Box 172"/>
+          <p:cNvSpPr txBox="1"/>
+          <p:nvPr/>
+        </p:nvSpPr>
+        <p:spPr>
+          <a:xfrm>
+            <a:off x="5718810" y="3444875"/>
+            <a:ext cx="175260" cy="275590"/>
+          </a:xfrm>
+          <a:prstGeom prst="rect">
+            <a:avLst/>
+          </a:prstGeom>
+          <a:noFill/>
+        </p:spPr>
+        <p:txBody>
+          <a:bodyPr wrap="square" rtlCol="0">
+            <a:spAutoFit/>
+          </a:bodyPr>
+          <a:p>
+            <a:r>
+              <a:rPr lang="en-US" sz="1200">
+                <a:solidFill>
+                  <a:schemeClr val="tx1"/>
+                </a:solidFill>
+              </a:rPr>
+              <a:t>A</a:t>
+            </a:r>
+            <a:endParaRPr lang="en-US" sz="1200">
+              <a:solidFill>
+                <a:schemeClr val="tx1"/>
+              </a:solidFill>
+            </a:endParaRPr>
+          </a:p>
+        </p:txBody>
+      </p:sp>
+      <p:sp>
+        <p:nvSpPr>
+          <p:cNvPr id="174" name="Text Box 173"/>
+          <p:cNvSpPr txBox="1"/>
+          <p:nvPr/>
+        </p:nvSpPr>
+        <p:spPr>
+          <a:xfrm>
+            <a:off x="5718810" y="3814445"/>
+            <a:ext cx="175260" cy="275590"/>
+          </a:xfrm>
+          <a:prstGeom prst="rect">
+            <a:avLst/>
+          </a:prstGeom>
+          <a:noFill/>
+        </p:spPr>
+        <p:txBody>
+          <a:bodyPr wrap="square" rtlCol="0">
+            <a:spAutoFit/>
+          </a:bodyPr>
+          <a:p>
+            <a:r>
+              <a:rPr lang="en-US" sz="1200">
+                <a:solidFill>
+                  <a:schemeClr val="tx1"/>
+                </a:solidFill>
+              </a:rPr>
+              <a:t>B</a:t>
+            </a:r>
+            <a:endParaRPr lang="en-US" sz="1200">
+              <a:solidFill>
+                <a:schemeClr val="tx1"/>
+              </a:solidFill>
+            </a:endParaRPr>
+          </a:p>
+        </p:txBody>
+      </p:sp>
+      <p:sp>
+        <p:nvSpPr>
+          <p:cNvPr id="175" name="Text Box 174"/>
+          <p:cNvSpPr txBox="1"/>
+          <p:nvPr/>
+        </p:nvSpPr>
+        <p:spPr>
+          <a:xfrm>
+            <a:off x="2560955" y="4408170"/>
+            <a:ext cx="2903855" cy="922020"/>
+          </a:xfrm>
+          <a:prstGeom prst="rect">
+            <a:avLst/>
+          </a:prstGeom>
+          <a:noFill/>
+        </p:spPr>
+        <p:txBody>
+          <a:bodyPr wrap="square" rtlCol="0">
+            <a:spAutoFit/>
+          </a:bodyPr>
+          <a:p>
+            <a:pPr algn="ctr"/>
+            <a:r>
+              <a:rPr lang="en-US"/>
+              <a:t>...</a:t>
+            </a:r>
+            <a:endParaRPr lang="en-US"/>
+          </a:p>
+          <a:p>
+            <a:pPr algn="l"/>
+            <a:r>
+              <a:rPr lang="en-US"/>
+              <a:t>Danh sách số ghế, click để chọn</a:t>
+            </a:r>
+            <a:endParaRPr lang="en-US"/>
+          </a:p>
+        </p:txBody>
+      </p:sp>
+      <p:sp>
+        <p:nvSpPr>
+          <p:cNvPr id="176" name="Rectangle 175"/>
+          <p:cNvSpPr/>
+          <p:nvPr/>
+        </p:nvSpPr>
+        <p:spPr>
+          <a:xfrm>
+            <a:off x="7713345" y="3402330"/>
+            <a:ext cx="2151380" cy="2152015"/>
+          </a:xfrm>
+          <a:prstGeom prst="rect">
+            <a:avLst/>
+          </a:prstGeom>
+          <a:noFill/>
+          <a:extLst>
+            <a:ext uri="{909E8E84-426E-40DD-AFC4-6F175D3DCCD1}">
+              <a14:hiddenFill xmlns:a14="http://schemas.microsoft.com/office/drawing/2010/main">
+                <a:solidFill>
+                  <a:schemeClr val="accent1"/>
+                </a:solidFill>
+              </a14:hiddenFill>
+            </a:ext>
+          </a:extLst>
+        </p:spPr>
+        <p:style>
+          <a:lnRef idx="2">
+            <a:schemeClr val="accent1">
+              <a:shade val="50000"/>
+            </a:schemeClr>
+          </a:lnRef>
+          <a:fillRef idx="1">
+            <a:schemeClr val="accent1"/>
+          </a:fillRef>
+          <a:effectRef idx="0">
+            <a:schemeClr val="accent1"/>
+          </a:effectRef>
+          <a:fontRef idx="minor">
+            <a:schemeClr val="lt1"/>
+          </a:fontRef>
+        </p:style>
+        <p:txBody>
+          <a:bodyPr rtlCol="0" anchor="ctr"/>
+          <a:p>
+            <a:pPr algn="ctr"/>
+            <a:r>
+              <a:rPr lang="en-US">
+                <a:solidFill>
+                  <a:schemeClr val="tx1"/>
+                </a:solidFill>
+              </a:rPr>
+              <a:t>Thông tin của vé gồm:</a:t>
+            </a:r>
+            <a:endParaRPr lang="en-US">
+              <a:solidFill>
+                <a:schemeClr val="tx1"/>
+              </a:solidFill>
+            </a:endParaRPr>
+          </a:p>
+          <a:p>
+            <a:pPr algn="ctr"/>
+            <a:r>
+              <a:rPr lang="en-US">
+                <a:solidFill>
+                  <a:schemeClr val="tx1"/>
+                </a:solidFill>
+              </a:rPr>
+              <a:t>Tên phim</a:t>
+            </a:r>
+            <a:endParaRPr lang="en-US">
+              <a:solidFill>
+                <a:schemeClr val="tx1"/>
+              </a:solidFill>
+            </a:endParaRPr>
+          </a:p>
+          <a:p>
+            <a:pPr algn="ctr"/>
+            <a:r>
+              <a:rPr lang="en-US">
+                <a:solidFill>
+                  <a:schemeClr val="tx1"/>
+                </a:solidFill>
+              </a:rPr>
+              <a:t>Suất chiếu</a:t>
+            </a:r>
+            <a:endParaRPr lang="en-US">
+              <a:solidFill>
+                <a:schemeClr val="tx1"/>
+              </a:solidFill>
+            </a:endParaRPr>
+          </a:p>
+          <a:p>
+            <a:pPr algn="ctr"/>
+            <a:r>
+              <a:rPr lang="en-US">
+                <a:solidFill>
+                  <a:schemeClr val="tx1"/>
+                </a:solidFill>
+              </a:rPr>
+              <a:t>Các ghế chọn</a:t>
+            </a:r>
+            <a:endParaRPr lang="en-US">
+              <a:solidFill>
+                <a:schemeClr val="tx1"/>
+              </a:solidFill>
+            </a:endParaRPr>
+          </a:p>
+          <a:p>
+            <a:pPr algn="ctr"/>
+            <a:r>
+              <a:rPr lang="en-US">
+                <a:solidFill>
+                  <a:schemeClr val="tx1"/>
+                </a:solidFill>
+              </a:rPr>
+              <a:t>Tổng tiền</a:t>
+            </a:r>
+            <a:endParaRPr lang="en-US">
+              <a:solidFill>
+                <a:schemeClr val="tx1"/>
+              </a:solidFill>
+            </a:endParaRPr>
+          </a:p>
+        </p:txBody>
+      </p:sp>
+      <p:sp>
+        <p:nvSpPr>
+          <p:cNvPr id="177" name="Rectangle 176"/>
+          <p:cNvSpPr/>
+          <p:nvPr/>
+        </p:nvSpPr>
+        <p:spPr>
+          <a:xfrm>
+            <a:off x="7774305" y="5816600"/>
+            <a:ext cx="953770" cy="419735"/>
+          </a:xfrm>
+          <a:prstGeom prst="rect">
+            <a:avLst/>
+          </a:prstGeom>
+          <a:noFill/>
+          <a:extLst>
+            <a:ext uri="{909E8E84-426E-40DD-AFC4-6F175D3DCCD1}">
+              <a14:hiddenFill xmlns:a14="http://schemas.microsoft.com/office/drawing/2010/main">
+                <a:solidFill>
+                  <a:schemeClr val="accent1"/>
+                </a:solidFill>
+              </a14:hiddenFill>
+            </a:ext>
+          </a:extLst>
+        </p:spPr>
+        <p:style>
+          <a:lnRef idx="2">
+            <a:schemeClr val="accent1">
+              <a:shade val="50000"/>
+            </a:schemeClr>
+          </a:lnRef>
+          <a:fillRef idx="1">
+            <a:schemeClr val="accent1"/>
+          </a:fillRef>
+          <a:effectRef idx="0">
+            <a:schemeClr val="accent1"/>
+          </a:effectRef>
+          <a:fontRef idx="minor">
+            <a:schemeClr val="lt1"/>
+          </a:fontRef>
+        </p:style>
+        <p:txBody>
+          <a:bodyPr rtlCol="0" anchor="ctr"/>
+          <a:p>
+            <a:pPr algn="ctr"/>
+            <a:r>
+              <a:rPr lang="en-US">
+                <a:solidFill>
+                  <a:schemeClr val="tx1"/>
+                </a:solidFill>
+              </a:rPr>
+              <a:t>Quay lại</a:t>
+            </a:r>
+            <a:endParaRPr lang="en-US">
+              <a:solidFill>
+                <a:schemeClr val="tx1"/>
+              </a:solidFill>
+            </a:endParaRPr>
+          </a:p>
+        </p:txBody>
+      </p:sp>
+      <p:sp>
+        <p:nvSpPr>
+          <p:cNvPr id="178" name="Rectangle 177"/>
+          <p:cNvSpPr/>
+          <p:nvPr/>
+        </p:nvSpPr>
+        <p:spPr>
+          <a:xfrm>
+            <a:off x="8810625" y="5816600"/>
+            <a:ext cx="953770" cy="419735"/>
+          </a:xfrm>
+          <a:prstGeom prst="rect">
+            <a:avLst/>
+          </a:prstGeom>
+          <a:noFill/>
+          <a:extLst>
+            <a:ext uri="{909E8E84-426E-40DD-AFC4-6F175D3DCCD1}">
+              <a14:hiddenFill xmlns:a14="http://schemas.microsoft.com/office/drawing/2010/main">
+                <a:solidFill>
+                  <a:schemeClr val="accent1"/>
+                </a:solidFill>
+              </a14:hiddenFill>
+            </a:ext>
+          </a:extLst>
+        </p:spPr>
+        <p:style>
+          <a:lnRef idx="2">
+            <a:schemeClr val="accent1">
+              <a:shade val="50000"/>
+            </a:schemeClr>
+          </a:lnRef>
+          <a:fillRef idx="1">
+            <a:schemeClr val="accent1"/>
+          </a:fillRef>
+          <a:effectRef idx="0">
+            <a:schemeClr val="accent1"/>
+          </a:effectRef>
+          <a:fontRef idx="minor">
+            <a:schemeClr val="lt1"/>
+          </a:fontRef>
+        </p:style>
+        <p:txBody>
+          <a:bodyPr rtlCol="0" anchor="ctr"/>
+          <a:p>
+            <a:pPr algn="ctr"/>
+            <a:r>
+              <a:rPr lang="en-US">
+                <a:solidFill>
+                  <a:schemeClr val="tx1"/>
+                </a:solidFill>
+              </a:rPr>
+              <a:t>Tiếp tục</a:t>
+            </a:r>
+            <a:endParaRPr lang="en-US">
+              <a:solidFill>
+                <a:schemeClr val="tx1"/>
+              </a:solidFill>
+            </a:endParaRPr>
+          </a:p>
+        </p:txBody>
+      </p:sp>
+      <p:sp>
+        <p:nvSpPr>
+          <p:cNvPr id="179" name="Text Box 178"/>
+          <p:cNvSpPr txBox="1"/>
+          <p:nvPr/>
+        </p:nvSpPr>
+        <p:spPr>
+          <a:xfrm>
+            <a:off x="10223500" y="4090035"/>
+            <a:ext cx="1337945" cy="2245360"/>
+          </a:xfrm>
+          <a:prstGeom prst="rect">
+            <a:avLst/>
+          </a:prstGeom>
+          <a:noFill/>
+        </p:spPr>
+        <p:txBody>
+          <a:bodyPr wrap="square" rtlCol="0">
+            <a:spAutoFit/>
+          </a:bodyPr>
+          <a:p>
+            <a:r>
+              <a:rPr lang="en-US" sz="1400"/>
+              <a:t>Nhấn tiếp tục sau khi chọn ghế để đến trang nhập thông tin cá nhân, hoặc nhấn quay lại để quay lại trang chọn suất chiếu</a:t>
+            </a:r>
+            <a:endParaRPr lang="en-US" sz="1400"/>
+          </a:p>
+        </p:txBody>
+      </p:sp>
+    </p:spTree>
+  </p:cSld>
+  <p:clrMapOvr>
+    <a:masterClrMapping/>
+  </p:clrMapOvr>
+</p:sld>
+</file>
+
+<file path=ppt/slides/slide4.xml><?xml version="1.0" encoding="utf-8"?>
+<p:sld xmlns:a="http://schemas.openxmlformats.org/drawingml/2006/main" xmlns:r="http://schemas.openxmlformats.org/officeDocument/2006/relationships" xmlns:p="http://schemas.openxmlformats.org/presentationml/2006/main">
+  <p:cSld>
+    <p:spTree>
+      <p:nvGrpSpPr>
+        <p:cNvPr id="1" name=""/>
+        <p:cNvGrpSpPr/>
+        <p:nvPr/>
+      </p:nvGrpSpPr>
+      <p:grpSpPr/>
+      <p:sp>
+        <p:nvSpPr>
+          <p:cNvPr id="69" name="Rounded Rectangle 68">
+            <a:hlinkClick r:id="rId1" action="ppaction://hlinksldjump"/>
+          </p:cNvPr>
+          <p:cNvSpPr/>
+          <p:nvPr/>
+        </p:nvSpPr>
+        <p:spPr>
+          <a:xfrm>
+            <a:off x="2232941" y="256387"/>
+            <a:ext cx="6074929" cy="754401"/>
+          </a:xfrm>
+          <a:prstGeom prst="roundRect">
+            <a:avLst/>
+          </a:prstGeom>
+          <a:solidFill>
+            <a:srgbClr val="002060"/>
+          </a:solidFill>
+          <a:ln w="38100" cap="rnd">
+            <a:solidFill>
+              <a:schemeClr val="bg1"/>
+            </a:solidFill>
+          </a:ln>
+          <a:effectLst>
+            <a:outerShdw blurRad="482600" dir="5400000" sx="89000" sy="89000" algn="ctr" rotWithShape="0">
+              <a:srgbClr val="000000">
+                <a:alpha val="49000"/>
+              </a:srgbClr>
+            </a:outerShdw>
+          </a:effectLst>
+          <a:scene3d>
+            <a:camera prst="orthographicFront"/>
+            <a:lightRig rig="twoPt" dir="t"/>
+          </a:scene3d>
+          <a:sp3d extrusionH="12700" prstMaterial="translucentPowder">
+            <a:bevelB w="165100" prst="coolSlant"/>
+          </a:sp3d>
+        </p:spPr>
+        <p:style>
+          <a:lnRef idx="2">
+            <a:schemeClr val="accent1">
+              <a:shade val="50000"/>
+            </a:schemeClr>
+          </a:lnRef>
+          <a:fillRef idx="1">
+            <a:schemeClr val="accent1"/>
+          </a:fillRef>
+          <a:effectRef idx="0">
+            <a:schemeClr val="accent1"/>
+          </a:effectRef>
+          <a:fontRef idx="minor">
+            <a:schemeClr val="lt1"/>
+          </a:fontRef>
+        </p:style>
+        <p:txBody>
+          <a:bodyPr rtlCol="0" anchor="ctr"/>
+          <a:p>
+            <a:pPr algn="ctr"/>
+            <a:r>
+              <a:rPr lang="en-US" sz="1600" b="1">
+                <a:solidFill>
+                  <a:prstClr val="white"/>
                 </a:solidFill>
                 <a:latin typeface="Arial" panose="020B0604020202020204" pitchFamily="34" charset="0"/>
                 <a:cs typeface="Arial" panose="020B0604020202020204" pitchFamily="34" charset="0"/>
-              </a:rPr>
-              <a:t>Nguyễn tiến Huy   Tháng </a:t>
+                <a:sym typeface="+mn-ea"/>
+              </a:rPr>
+              <a:t>Công ty Galaxy Cinema </a:t>
             </a:r>
             <a:r>
               <a:rPr lang="en-US" sz="1600">
                 <a:solidFill>
-                  <a:srgbClr val="002060"/>
+                  <a:prstClr val="white"/>
                 </a:solidFill>
                 <a:latin typeface="Arial" panose="020B0604020202020204" pitchFamily="34" charset="0"/>
                 <a:cs typeface="Arial" panose="020B0604020202020204" pitchFamily="34" charset="0"/>
-              </a:rPr>
-              <a:t>2</a:t>
-            </a:r>
-            <a:r>
-              <a:rPr lang="vi-VN" sz="1600">
-                <a:solidFill>
-                  <a:srgbClr val="002060"/>
+                <a:sym typeface="+mn-ea"/>
+              </a:rPr>
+              <a:t>( Mã số : </a:t>
+            </a:r>
+            <a:r>
+              <a:rPr lang="en-US" sz="1600">
+                <a:solidFill>
+                  <a:schemeClr val="bg1"/>
                 </a:solidFill>
                 <a:latin typeface="Arial" panose="020B0604020202020204" pitchFamily="34" charset="0"/>
                 <a:cs typeface="Arial" panose="020B0604020202020204" pitchFamily="34" charset="0"/>
-              </a:rPr>
-              <a:t>/201</a:t>
+                <a:sym typeface="+mn-ea"/>
+              </a:rPr>
+              <a:t>Galaxy_Cinema</a:t>
             </a:r>
             <a:r>
               <a:rPr lang="en-US" sz="1600">
                 <a:solidFill>
-                  <a:srgbClr val="002060"/>
+                  <a:prstClr val="white"/>
                 </a:solidFill>
                 <a:latin typeface="Arial" panose="020B0604020202020204" pitchFamily="34" charset="0"/>
                 <a:cs typeface="Arial" panose="020B0604020202020204" pitchFamily="34" charset="0"/>
-              </a:rPr>
-              <a:t>8</a:t>
+                <a:sym typeface="+mn-ea"/>
+              </a:rPr>
+              <a:t>)</a:t>
+            </a:r>
+            <a:endParaRPr lang="en-US" sz="1600">
+              <a:solidFill>
+                <a:prstClr val="white"/>
+              </a:solidFill>
+              <a:latin typeface="Arial" panose="020B0604020202020204" pitchFamily="34" charset="0"/>
+              <a:cs typeface="Arial" panose="020B0604020202020204" pitchFamily="34" charset="0"/>
+            </a:endParaRPr>
+          </a:p>
+          <a:p>
+            <a:pPr algn="ctr"/>
+            <a:r>
+              <a:rPr lang="en-US" sz="1600" b="1">
+                <a:solidFill>
+                  <a:srgbClr val="FFFF00"/>
+                </a:solidFill>
+                <a:latin typeface="Arial" panose="020B0604020202020204" pitchFamily="34" charset="0"/>
+                <a:cs typeface="Arial" panose="020B0604020202020204" pitchFamily="34" charset="0"/>
+                <a:sym typeface="+mn-ea"/>
+              </a:rPr>
+              <a:t>1-Giao diện  </a:t>
             </a:r>
             <a:endParaRPr lang="vi-VN" sz="1600">
+              <a:solidFill>
+                <a:srgbClr val="FFFF00"/>
+              </a:solidFill>
+              <a:latin typeface="Arial" panose="020B0604020202020204" pitchFamily="34" charset="0"/>
+              <a:cs typeface="Arial" panose="020B0604020202020204" pitchFamily="34" charset="0"/>
+            </a:endParaRPr>
+          </a:p>
+        </p:txBody>
+      </p:sp>
+      <p:sp>
+        <p:nvSpPr>
+          <p:cNvPr id="4" name="Text Box 3"/>
+          <p:cNvSpPr txBox="1"/>
+          <p:nvPr/>
+        </p:nvSpPr>
+        <p:spPr>
+          <a:xfrm>
+            <a:off x="527685" y="1338580"/>
+            <a:ext cx="3691255" cy="368300"/>
+          </a:xfrm>
+          <a:prstGeom prst="rect">
+            <a:avLst/>
+          </a:prstGeom>
+          <a:noFill/>
+        </p:spPr>
+        <p:txBody>
+          <a:bodyPr wrap="square" rtlCol="0">
+            <a:spAutoFit/>
+          </a:bodyPr>
+          <a:p>
+            <a:r>
+              <a:rPr lang="en-US"/>
+              <a:t>Màn hình nhập thông tin cá nhân</a:t>
+            </a:r>
+            <a:endParaRPr lang="en-US"/>
+          </a:p>
+        </p:txBody>
+      </p:sp>
+      <p:sp>
+        <p:nvSpPr>
+          <p:cNvPr id="50" name="Rectangle 49"/>
+          <p:cNvSpPr/>
+          <p:nvPr/>
+        </p:nvSpPr>
+        <p:spPr>
+          <a:xfrm>
+            <a:off x="279400" y="1900555"/>
+            <a:ext cx="11633835" cy="4775200"/>
+          </a:xfrm>
+          <a:prstGeom prst="rect">
+            <a:avLst/>
+          </a:prstGeom>
+          <a:solidFill>
+            <a:schemeClr val="bg1"/>
+          </a:solidFill>
+        </p:spPr>
+        <p:style>
+          <a:lnRef idx="2">
+            <a:schemeClr val="accent1">
+              <a:shade val="50000"/>
+            </a:schemeClr>
+          </a:lnRef>
+          <a:fillRef idx="1">
+            <a:schemeClr val="accent1"/>
+          </a:fillRef>
+          <a:effectRef idx="0">
+            <a:schemeClr val="accent1"/>
+          </a:effectRef>
+          <a:fontRef idx="minor">
+            <a:schemeClr val="lt1"/>
+          </a:fontRef>
+        </p:style>
+        <p:txBody>
+          <a:bodyPr rtlCol="0" anchor="ctr"/>
+          <a:p>
+            <a:pPr algn="ctr"/>
+            <a:endParaRPr lang="en-US"/>
+          </a:p>
+        </p:txBody>
+      </p:sp>
+      <p:sp>
+        <p:nvSpPr>
+          <p:cNvPr id="52" name="Text Box 51"/>
+          <p:cNvSpPr txBox="1"/>
+          <p:nvPr/>
+        </p:nvSpPr>
+        <p:spPr>
+          <a:xfrm>
+            <a:off x="2781300" y="1995170"/>
+            <a:ext cx="5104130" cy="368300"/>
+          </a:xfrm>
+          <a:prstGeom prst="rect">
+            <a:avLst/>
+          </a:prstGeom>
+          <a:noFill/>
+          <a:ln>
+            <a:solidFill>
+              <a:schemeClr val="tx1"/>
+            </a:solidFill>
+          </a:ln>
+        </p:spPr>
+        <p:txBody>
+          <a:bodyPr wrap="square" rtlCol="0">
+            <a:spAutoFit/>
+          </a:bodyPr>
+          <a:p>
+            <a:r>
+              <a:rPr lang="en-US"/>
+              <a:t>Khung tìm kiếm phim</a:t>
+            </a:r>
+            <a:endParaRPr lang="en-US"/>
+          </a:p>
+        </p:txBody>
+      </p:sp>
+      <p:sp>
+        <p:nvSpPr>
+          <p:cNvPr id="53" name="Text Box 52"/>
+          <p:cNvSpPr txBox="1"/>
+          <p:nvPr/>
+        </p:nvSpPr>
+        <p:spPr>
+          <a:xfrm>
+            <a:off x="677545" y="1995170"/>
+            <a:ext cx="977265" cy="368300"/>
+          </a:xfrm>
+          <a:prstGeom prst="rect">
+            <a:avLst/>
+          </a:prstGeom>
+          <a:noFill/>
+          <a:ln>
+            <a:solidFill>
+              <a:schemeClr val="tx1"/>
+            </a:solidFill>
+          </a:ln>
+        </p:spPr>
+        <p:txBody>
+          <a:bodyPr wrap="square" rtlCol="0">
+            <a:spAutoFit/>
+          </a:bodyPr>
+          <a:p>
+            <a:r>
+              <a:rPr lang="en-US"/>
+              <a:t>Logo</a:t>
+            </a:r>
+            <a:endParaRPr lang="en-US"/>
+          </a:p>
+        </p:txBody>
+      </p:sp>
+      <p:sp>
+        <p:nvSpPr>
+          <p:cNvPr id="97" name="Rectangle 96"/>
+          <p:cNvSpPr/>
+          <p:nvPr/>
+        </p:nvSpPr>
+        <p:spPr>
+          <a:xfrm>
+            <a:off x="279400" y="2503805"/>
+            <a:ext cx="11633835" cy="548640"/>
+          </a:xfrm>
+          <a:prstGeom prst="rect">
+            <a:avLst/>
+          </a:prstGeom>
+          <a:solidFill>
+            <a:schemeClr val="bg2"/>
+          </a:solidFill>
+        </p:spPr>
+        <p:style>
+          <a:lnRef idx="2">
+            <a:schemeClr val="accent1">
+              <a:shade val="50000"/>
+            </a:schemeClr>
+          </a:lnRef>
+          <a:fillRef idx="1">
+            <a:schemeClr val="accent1"/>
+          </a:fillRef>
+          <a:effectRef idx="0">
+            <a:schemeClr val="accent1"/>
+          </a:effectRef>
+          <a:fontRef idx="minor">
+            <a:schemeClr val="lt1"/>
+          </a:fontRef>
+        </p:style>
+        <p:txBody>
+          <a:bodyPr rtlCol="0" anchor="ctr"/>
+          <a:p>
+            <a:pPr algn="ctr"/>
+            <a:endParaRPr lang="en-US"/>
+          </a:p>
+        </p:txBody>
+      </p:sp>
+      <p:sp>
+        <p:nvSpPr>
+          <p:cNvPr id="2" name="Text Box 1"/>
+          <p:cNvSpPr txBox="1"/>
+          <p:nvPr/>
+        </p:nvSpPr>
+        <p:spPr>
+          <a:xfrm>
+            <a:off x="3273425" y="3348990"/>
+            <a:ext cx="4767580" cy="368300"/>
+          </a:xfrm>
+          <a:prstGeom prst="rect">
+            <a:avLst/>
+          </a:prstGeom>
+          <a:noFill/>
+          <a:ln>
+            <a:solidFill>
+              <a:schemeClr val="tx1"/>
+            </a:solidFill>
+          </a:ln>
+        </p:spPr>
+        <p:txBody>
+          <a:bodyPr wrap="square" rtlCol="0">
+            <a:spAutoFit/>
+          </a:bodyPr>
+          <a:p>
+            <a:r>
+              <a:rPr lang="en-US"/>
+              <a:t>Nhập họ tên</a:t>
+            </a:r>
+            <a:endParaRPr lang="en-US"/>
+          </a:p>
+        </p:txBody>
+      </p:sp>
+      <p:sp>
+        <p:nvSpPr>
+          <p:cNvPr id="3" name="Text Box 2"/>
+          <p:cNvSpPr txBox="1"/>
+          <p:nvPr/>
+        </p:nvSpPr>
+        <p:spPr>
+          <a:xfrm>
+            <a:off x="3255645" y="3987800"/>
+            <a:ext cx="4767580" cy="368300"/>
+          </a:xfrm>
+          <a:prstGeom prst="rect">
+            <a:avLst/>
+          </a:prstGeom>
+          <a:noFill/>
+          <a:ln>
+            <a:solidFill>
+              <a:schemeClr val="tx1"/>
+            </a:solidFill>
+          </a:ln>
+        </p:spPr>
+        <p:txBody>
+          <a:bodyPr wrap="square" rtlCol="0">
+            <a:spAutoFit/>
+          </a:bodyPr>
+          <a:p>
+            <a:r>
+              <a:rPr lang="en-US"/>
+              <a:t>Nhập email</a:t>
+            </a:r>
+            <a:endParaRPr lang="en-US"/>
+          </a:p>
+        </p:txBody>
+      </p:sp>
+      <p:sp>
+        <p:nvSpPr>
+          <p:cNvPr id="5" name="Text Box 4"/>
+          <p:cNvSpPr txBox="1"/>
+          <p:nvPr/>
+        </p:nvSpPr>
+        <p:spPr>
+          <a:xfrm>
+            <a:off x="3273425" y="4573905"/>
+            <a:ext cx="4767580" cy="368300"/>
+          </a:xfrm>
+          <a:prstGeom prst="rect">
+            <a:avLst/>
+          </a:prstGeom>
+          <a:noFill/>
+          <a:ln>
+            <a:solidFill>
+              <a:schemeClr val="tx1"/>
+            </a:solidFill>
+          </a:ln>
+        </p:spPr>
+        <p:txBody>
+          <a:bodyPr wrap="square" rtlCol="0">
+            <a:spAutoFit/>
+          </a:bodyPr>
+          <a:p>
+            <a:r>
+              <a:rPr lang="en-US"/>
+              <a:t>Nhập điện thoại</a:t>
+            </a:r>
+            <a:endParaRPr lang="en-US"/>
+          </a:p>
+        </p:txBody>
+      </p:sp>
+      <p:sp>
+        <p:nvSpPr>
+          <p:cNvPr id="6" name="Text Box 5"/>
+          <p:cNvSpPr txBox="1"/>
+          <p:nvPr/>
+        </p:nvSpPr>
+        <p:spPr>
+          <a:xfrm>
+            <a:off x="3255645" y="5212080"/>
+            <a:ext cx="4767580" cy="368300"/>
+          </a:xfrm>
+          <a:prstGeom prst="rect">
+            <a:avLst/>
+          </a:prstGeom>
+          <a:noFill/>
+          <a:ln>
+            <a:solidFill>
+              <a:schemeClr val="tx1"/>
+            </a:solidFill>
+          </a:ln>
+        </p:spPr>
+        <p:txBody>
+          <a:bodyPr wrap="square" rtlCol="0">
+            <a:spAutoFit/>
+          </a:bodyPr>
+          <a:p>
+            <a:r>
+              <a:rPr lang="en-US"/>
+              <a:t>Nhập mã nhận vé</a:t>
+            </a:r>
+            <a:endParaRPr lang="en-US"/>
+          </a:p>
+        </p:txBody>
+      </p:sp>
+      <p:sp>
+        <p:nvSpPr>
+          <p:cNvPr id="177" name="Rectangle 176"/>
+          <p:cNvSpPr/>
+          <p:nvPr/>
+        </p:nvSpPr>
+        <p:spPr>
+          <a:xfrm>
+            <a:off x="4319270" y="5930265"/>
+            <a:ext cx="953770" cy="419735"/>
+          </a:xfrm>
+          <a:prstGeom prst="rect">
+            <a:avLst/>
+          </a:prstGeom>
+          <a:noFill/>
+          <a:extLst>
+            <a:ext uri="{909E8E84-426E-40DD-AFC4-6F175D3DCCD1}">
+              <a14:hiddenFill xmlns:a14="http://schemas.microsoft.com/office/drawing/2010/main">
+                <a:solidFill>
+                  <a:schemeClr val="accent1"/>
+                </a:solidFill>
+              </a14:hiddenFill>
+            </a:ext>
+          </a:extLst>
+        </p:spPr>
+        <p:style>
+          <a:lnRef idx="2">
+            <a:schemeClr val="accent1">
+              <a:shade val="50000"/>
+            </a:schemeClr>
+          </a:lnRef>
+          <a:fillRef idx="1">
+            <a:schemeClr val="accent1"/>
+          </a:fillRef>
+          <a:effectRef idx="0">
+            <a:schemeClr val="accent1"/>
+          </a:effectRef>
+          <a:fontRef idx="minor">
+            <a:schemeClr val="lt1"/>
+          </a:fontRef>
+        </p:style>
+        <p:txBody>
+          <a:bodyPr rtlCol="0" anchor="ctr"/>
+          <a:p>
+            <a:pPr algn="ctr"/>
+            <a:r>
+              <a:rPr lang="en-US">
+                <a:solidFill>
+                  <a:schemeClr val="tx1"/>
+                </a:solidFill>
+              </a:rPr>
+              <a:t>Quay lại</a:t>
+            </a:r>
+            <a:endParaRPr lang="en-US">
+              <a:solidFill>
+                <a:schemeClr val="tx1"/>
+              </a:solidFill>
+            </a:endParaRPr>
+          </a:p>
+        </p:txBody>
+      </p:sp>
+      <p:sp>
+        <p:nvSpPr>
+          <p:cNvPr id="178" name="Rectangle 177"/>
+          <p:cNvSpPr/>
+          <p:nvPr/>
+        </p:nvSpPr>
+        <p:spPr>
+          <a:xfrm>
+            <a:off x="5355590" y="5930265"/>
+            <a:ext cx="953770" cy="419735"/>
+          </a:xfrm>
+          <a:prstGeom prst="rect">
+            <a:avLst/>
+          </a:prstGeom>
+          <a:noFill/>
+          <a:extLst>
+            <a:ext uri="{909E8E84-426E-40DD-AFC4-6F175D3DCCD1}">
+              <a14:hiddenFill xmlns:a14="http://schemas.microsoft.com/office/drawing/2010/main">
+                <a:solidFill>
+                  <a:schemeClr val="accent1"/>
+                </a:solidFill>
+              </a14:hiddenFill>
+            </a:ext>
+          </a:extLst>
+        </p:spPr>
+        <p:style>
+          <a:lnRef idx="2">
+            <a:schemeClr val="accent1">
+              <a:shade val="50000"/>
+            </a:schemeClr>
+          </a:lnRef>
+          <a:fillRef idx="1">
+            <a:schemeClr val="accent1"/>
+          </a:fillRef>
+          <a:effectRef idx="0">
+            <a:schemeClr val="accent1"/>
+          </a:effectRef>
+          <a:fontRef idx="minor">
+            <a:schemeClr val="lt1"/>
+          </a:fontRef>
+        </p:style>
+        <p:txBody>
+          <a:bodyPr rtlCol="0" anchor="ctr"/>
+          <a:p>
+            <a:pPr algn="ctr"/>
+            <a:r>
+              <a:rPr lang="en-US">
+                <a:solidFill>
+                  <a:schemeClr val="tx1"/>
+                </a:solidFill>
+              </a:rPr>
+              <a:t>Đặt vé</a:t>
+            </a:r>
+            <a:endParaRPr lang="en-US">
+              <a:solidFill>
+                <a:schemeClr val="tx1"/>
+              </a:solidFill>
+            </a:endParaRPr>
+          </a:p>
+        </p:txBody>
+      </p:sp>
+      <p:sp>
+        <p:nvSpPr>
+          <p:cNvPr id="179" name="Text Box 178"/>
+          <p:cNvSpPr txBox="1"/>
+          <p:nvPr/>
+        </p:nvSpPr>
+        <p:spPr>
+          <a:xfrm>
+            <a:off x="8823960" y="3987800"/>
+            <a:ext cx="1337945" cy="1814830"/>
+          </a:xfrm>
+          <a:prstGeom prst="rect">
+            <a:avLst/>
+          </a:prstGeom>
+          <a:noFill/>
+        </p:spPr>
+        <p:txBody>
+          <a:bodyPr wrap="square" rtlCol="0">
+            <a:spAutoFit/>
+          </a:bodyPr>
+          <a:p>
+            <a:r>
+              <a:rPr lang="en-US" sz="1400"/>
+              <a:t>Nhấn đặt vé sau khi nhập thông tin cá nhân để hoàn thành đặt vé, hoặc nhấn quay lại để quay lại trang chọn ghế</a:t>
+            </a:r>
+            <a:endParaRPr lang="en-US" sz="1400"/>
+          </a:p>
+        </p:txBody>
+      </p:sp>
+    </p:spTree>
+  </p:cSld>
+  <p:clrMapOvr>
+    <a:masterClrMapping/>
+  </p:clrMapOvr>
+</p:sld>
+</file>
+
+<file path=ppt/slides/slide5.xml><?xml version="1.0" encoding="utf-8"?>
+<p:sld xmlns:a="http://schemas.openxmlformats.org/drawingml/2006/main" xmlns:r="http://schemas.openxmlformats.org/officeDocument/2006/relationships" xmlns:p="http://schemas.openxmlformats.org/presentationml/2006/main">
+  <p:cSld>
+    <p:spTree>
+      <p:nvGrpSpPr>
+        <p:cNvPr id="1" name=""/>
+        <p:cNvGrpSpPr/>
+        <p:nvPr/>
+      </p:nvGrpSpPr>
+      <p:grpSpPr>
+        <a:xfrm>
+          <a:off x="0" y="0"/>
+          <a:ext cx="0" cy="0"/>
+          <a:chOff x="0" y="0"/>
+          <a:chExt cx="0" cy="0"/>
+        </a:xfrm>
+      </p:grpSpPr>
+      <p:sp>
+        <p:nvSpPr>
+          <p:cNvPr id="69" name="Rounded Rectangle 68">
+            <a:hlinkClick r:id="rId1" action="ppaction://hlinksldjump"/>
+          </p:cNvPr>
+          <p:cNvSpPr/>
+          <p:nvPr/>
+        </p:nvSpPr>
+        <p:spPr>
+          <a:xfrm>
+            <a:off x="2232941" y="256387"/>
+            <a:ext cx="6074929" cy="754401"/>
+          </a:xfrm>
+          <a:prstGeom prst="roundRect">
+            <a:avLst/>
+          </a:prstGeom>
+          <a:solidFill>
+            <a:srgbClr val="002060"/>
+          </a:solidFill>
+          <a:ln w="38100" cap="rnd">
+            <a:solidFill>
+              <a:schemeClr val="bg1"/>
+            </a:solidFill>
+          </a:ln>
+          <a:effectLst>
+            <a:outerShdw blurRad="482600" dir="5400000" sx="89000" sy="89000" algn="ctr" rotWithShape="0">
+              <a:srgbClr val="000000">
+                <a:alpha val="49000"/>
+              </a:srgbClr>
+            </a:outerShdw>
+          </a:effectLst>
+          <a:scene3d>
+            <a:camera prst="orthographicFront"/>
+            <a:lightRig rig="twoPt" dir="t"/>
+          </a:scene3d>
+          <a:sp3d extrusionH="12700" prstMaterial="translucentPowder">
+            <a:bevelB w="165100" prst="coolSlant"/>
+          </a:sp3d>
+        </p:spPr>
+        <p:style>
+          <a:lnRef idx="2">
+            <a:schemeClr val="accent1">
+              <a:shade val="50000"/>
+            </a:schemeClr>
+          </a:lnRef>
+          <a:fillRef idx="1">
+            <a:schemeClr val="accent1"/>
+          </a:fillRef>
+          <a:effectRef idx="0">
+            <a:schemeClr val="accent1"/>
+          </a:effectRef>
+          <a:fontRef idx="minor">
+            <a:schemeClr val="lt1"/>
+          </a:fontRef>
+        </p:style>
+        <p:txBody>
+          <a:bodyPr rtlCol="0" anchor="ctr"/>
+          <a:lstStyle/>
+          <a:p>
+            <a:pPr algn="ctr"/>
+            <a:r>
+              <a:rPr lang="en-US" sz="1600" b="1">
+                <a:solidFill>
+                  <a:prstClr val="white"/>
+                </a:solidFill>
+                <a:latin typeface="Arial" panose="020B0604020202020204" pitchFamily="34" charset="0"/>
+                <a:cs typeface="Arial" panose="020B0604020202020204" pitchFamily="34" charset="0"/>
+                <a:sym typeface="+mn-ea"/>
+              </a:rPr>
+              <a:t>Công ty Galaxy Cinema </a:t>
+            </a:r>
+            <a:r>
+              <a:rPr lang="en-US" sz="1600">
+                <a:solidFill>
+                  <a:prstClr val="white"/>
+                </a:solidFill>
+                <a:latin typeface="Arial" panose="020B0604020202020204" pitchFamily="34" charset="0"/>
+                <a:cs typeface="Arial" panose="020B0604020202020204" pitchFamily="34" charset="0"/>
+                <a:sym typeface="+mn-ea"/>
+              </a:rPr>
+              <a:t>( Mã số : </a:t>
+            </a:r>
+            <a:r>
+              <a:rPr lang="en-US" sz="1600">
+                <a:solidFill>
+                  <a:schemeClr val="bg1"/>
+                </a:solidFill>
+                <a:latin typeface="Arial" panose="020B0604020202020204" pitchFamily="34" charset="0"/>
+                <a:cs typeface="Arial" panose="020B0604020202020204" pitchFamily="34" charset="0"/>
+                <a:sym typeface="+mn-ea"/>
+              </a:rPr>
+              <a:t>Galaxy_Cinema</a:t>
+            </a:r>
+            <a:r>
+              <a:rPr lang="en-US" sz="1600">
+                <a:solidFill>
+                  <a:prstClr val="white"/>
+                </a:solidFill>
+                <a:latin typeface="Arial" panose="020B0604020202020204" pitchFamily="34" charset="0"/>
+                <a:cs typeface="Arial" panose="020B0604020202020204" pitchFamily="34" charset="0"/>
+                <a:sym typeface="+mn-ea"/>
+              </a:rPr>
+              <a:t>)</a:t>
+            </a:r>
+            <a:endParaRPr lang="en-US" sz="1600">
+              <a:solidFill>
+                <a:prstClr val="white"/>
+              </a:solidFill>
+              <a:latin typeface="Arial" panose="020B0604020202020204" pitchFamily="34" charset="0"/>
+              <a:cs typeface="Arial" panose="020B0604020202020204" pitchFamily="34" charset="0"/>
+            </a:endParaRPr>
+          </a:p>
+          <a:p>
+            <a:pPr algn="ctr"/>
+            <a:r>
+              <a:rPr lang="en-US" sz="1600" b="1">
+                <a:solidFill>
+                  <a:srgbClr val="FFFF00"/>
+                </a:solidFill>
+                <a:latin typeface="Arial" panose="020B0604020202020204" pitchFamily="34" charset="0"/>
+                <a:cs typeface="Arial" panose="020B0604020202020204" pitchFamily="34" charset="0"/>
+                <a:sym typeface="+mn-ea"/>
+              </a:rPr>
+              <a:t>3A-Mô hình Đối tượng   </a:t>
+            </a:r>
+            <a:endParaRPr lang="vi-VN" sz="1600">
+              <a:solidFill>
+                <a:srgbClr val="FFFF00"/>
+              </a:solidFill>
+              <a:latin typeface="Arial" panose="020B0604020202020204" pitchFamily="34" charset="0"/>
+              <a:cs typeface="Arial" panose="020B0604020202020204" pitchFamily="34" charset="0"/>
+            </a:endParaRPr>
+          </a:p>
+        </p:txBody>
+      </p:sp>
+      <p:grpSp>
+        <p:nvGrpSpPr>
+          <p:cNvPr id="4" name="Group 3"/>
+          <p:cNvGrpSpPr/>
+          <p:nvPr/>
+        </p:nvGrpSpPr>
+        <p:grpSpPr>
+          <a:xfrm>
+            <a:off x="330153" y="1062805"/>
+            <a:ext cx="4107738" cy="1074519"/>
+            <a:chOff x="903567" y="2937671"/>
+            <a:chExt cx="1767100" cy="1074519"/>
+          </a:xfrm>
+        </p:grpSpPr>
+        <p:sp>
+          <p:nvSpPr>
+            <p:cNvPr id="5" name="TextBox 25"/>
+            <p:cNvSpPr txBox="1"/>
+            <p:nvPr/>
+          </p:nvSpPr>
+          <p:spPr>
+            <a:xfrm>
+              <a:off x="903567" y="2937671"/>
+              <a:ext cx="1767100" cy="337185"/>
+            </a:xfrm>
+            <a:prstGeom prst="rect">
+              <a:avLst/>
+            </a:prstGeom>
+            <a:noFill/>
+            <a:ln>
+              <a:solidFill>
+                <a:schemeClr val="tx1"/>
+              </a:solidFill>
+            </a:ln>
+          </p:spPr>
+          <p:txBody>
+            <a:bodyPr wrap="square" rtlCol="0">
+              <a:spAutoFit/>
+            </a:bodyPr>
+            <a:lstStyle/>
+            <a:p>
+              <a:pPr algn="ctr"/>
+              <a:r>
+                <a:rPr lang="en-US" sz="1600" b="1">
+                  <a:solidFill>
+                    <a:srgbClr val="002060"/>
+                  </a:solidFill>
+                  <a:latin typeface="Arial" panose="020B0604020202020204" pitchFamily="34" charset="0"/>
+                  <a:cs typeface="Arial" panose="020B0604020202020204" pitchFamily="34" charset="0"/>
+                </a:rPr>
+                <a:t>XL_CONG_TY</a:t>
+              </a:r>
+              <a:endParaRPr lang="en-US" sz="1600" b="1">
+                <a:latin typeface="Arial" panose="020B0604020202020204" pitchFamily="34" charset="0"/>
+                <a:cs typeface="Arial" panose="020B0604020202020204" pitchFamily="34" charset="0"/>
+              </a:endParaRPr>
+            </a:p>
+          </p:txBody>
+        </p:sp>
+        <p:sp>
+          <p:nvSpPr>
+            <p:cNvPr id="6" name="TextBox 26"/>
+            <p:cNvSpPr txBox="1"/>
+            <p:nvPr/>
+          </p:nvSpPr>
+          <p:spPr>
+            <a:xfrm>
+              <a:off x="903567" y="3274955"/>
+              <a:ext cx="1767100" cy="737235"/>
+            </a:xfrm>
+            <a:prstGeom prst="rect">
+              <a:avLst/>
+            </a:prstGeom>
+            <a:noFill/>
+            <a:ln>
+              <a:solidFill>
+                <a:schemeClr val="tx1"/>
+              </a:solidFill>
+            </a:ln>
+          </p:spPr>
+          <p:txBody>
+            <a:bodyPr wrap="square" rtlCol="0">
+              <a:spAutoFit/>
+            </a:bodyPr>
+            <a:lstStyle/>
+            <a:p>
+              <a:r>
+                <a:rPr lang="en-US" sz="1400">
+                  <a:latin typeface="Arial" panose="020B0604020202020204" pitchFamily="34" charset="0"/>
+                  <a:cs typeface="Arial" panose="020B0604020202020204" pitchFamily="34" charset="0"/>
+                </a:rPr>
+                <a:t>Ten,Ma_so,Dien_thoai,Dia_chi</a:t>
+              </a:r>
+              <a:endParaRPr lang="en-US" sz="1400">
+                <a:latin typeface="Arial" panose="020B0604020202020204" pitchFamily="34" charset="0"/>
+                <a:cs typeface="Arial" panose="020B0604020202020204" pitchFamily="34" charset="0"/>
+              </a:endParaRPr>
+            </a:p>
+            <a:p>
+              <a:r>
+                <a:rPr lang="en-US" sz="1400">
+                  <a:solidFill>
+                    <a:schemeClr val="accent2">
+                      <a:lumMod val="50000"/>
+                    </a:schemeClr>
+                  </a:solidFill>
+                  <a:latin typeface="Arial" panose="020B0604020202020204" pitchFamily="34" charset="0"/>
+                  <a:cs typeface="Arial" panose="020B0604020202020204" pitchFamily="34" charset="0"/>
+                </a:rPr>
+                <a:t>Danh_sach_Rap</a:t>
+              </a:r>
+              <a:r>
+                <a:rPr lang="en-US" sz="1400" i="1">
+                  <a:latin typeface="Arial" panose="020B0604020202020204" pitchFamily="34" charset="0"/>
+                  <a:cs typeface="Arial" panose="020B0604020202020204" pitchFamily="34" charset="0"/>
+                </a:rPr>
+                <a:t> : </a:t>
+              </a:r>
+              <a:r>
+                <a:rPr lang="en-US" sz="1400">
+                  <a:latin typeface="Arial" panose="020B0604020202020204" pitchFamily="34" charset="0"/>
+                  <a:cs typeface="Arial" panose="020B0604020202020204" pitchFamily="34" charset="0"/>
+                </a:rPr>
+                <a:t>Ten,Ma_so, Danh_sach_Phong_chieu</a:t>
+              </a:r>
+              <a:endParaRPr lang="en-US" sz="1400">
+                <a:latin typeface="Arial" panose="020B0604020202020204" pitchFamily="34" charset="0"/>
+                <a:cs typeface="Arial" panose="020B0604020202020204" pitchFamily="34" charset="0"/>
+              </a:endParaRPr>
+            </a:p>
+          </p:txBody>
+        </p:sp>
+      </p:grpSp>
+      <p:grpSp>
+        <p:nvGrpSpPr>
+          <p:cNvPr id="7" name="Group 6"/>
+          <p:cNvGrpSpPr/>
+          <p:nvPr/>
+        </p:nvGrpSpPr>
+        <p:grpSpPr>
+          <a:xfrm>
+            <a:off x="119783" y="2240922"/>
+            <a:ext cx="5173080" cy="1506954"/>
+            <a:chOff x="903567" y="2937671"/>
+            <a:chExt cx="1767100" cy="1506954"/>
+          </a:xfrm>
+        </p:grpSpPr>
+        <p:sp>
+          <p:nvSpPr>
+            <p:cNvPr id="8" name="TextBox 28"/>
+            <p:cNvSpPr txBox="1"/>
+            <p:nvPr/>
+          </p:nvSpPr>
+          <p:spPr>
+            <a:xfrm>
+              <a:off x="903567" y="2937671"/>
+              <a:ext cx="1767100" cy="337185"/>
+            </a:xfrm>
+            <a:prstGeom prst="rect">
+              <a:avLst/>
+            </a:prstGeom>
+            <a:noFill/>
+            <a:ln>
+              <a:solidFill>
+                <a:schemeClr val="tx1"/>
+              </a:solidFill>
+            </a:ln>
+          </p:spPr>
+          <p:txBody>
+            <a:bodyPr wrap="square" rtlCol="0">
+              <a:spAutoFit/>
+            </a:bodyPr>
+            <a:lstStyle/>
+            <a:p>
+              <a:pPr algn="ctr"/>
+              <a:r>
+                <a:rPr lang="en-US" sz="1600" b="1">
+                  <a:solidFill>
+                    <a:srgbClr val="002060"/>
+                  </a:solidFill>
+                  <a:latin typeface="Arial" panose="020B0604020202020204" pitchFamily="34" charset="0"/>
+                  <a:cs typeface="Arial" panose="020B0604020202020204" pitchFamily="34" charset="0"/>
+                </a:rPr>
+                <a:t>XL_PHIM  </a:t>
+              </a:r>
+              <a:endParaRPr lang="en-US" sz="1600" b="1">
+                <a:latin typeface="Arial" panose="020B0604020202020204" pitchFamily="34" charset="0"/>
+                <a:cs typeface="Arial" panose="020B0604020202020204" pitchFamily="34" charset="0"/>
+              </a:endParaRPr>
+            </a:p>
+          </p:txBody>
+        </p:sp>
+        <p:sp>
+          <p:nvSpPr>
+            <p:cNvPr id="9" name="TextBox 29"/>
+            <p:cNvSpPr txBox="1"/>
+            <p:nvPr/>
+          </p:nvSpPr>
+          <p:spPr>
+            <a:xfrm>
+              <a:off x="903567" y="3276225"/>
+              <a:ext cx="1767100" cy="1168400"/>
+            </a:xfrm>
+            <a:prstGeom prst="rect">
+              <a:avLst/>
+            </a:prstGeom>
+            <a:noFill/>
+            <a:ln>
+              <a:solidFill>
+                <a:schemeClr val="tx1"/>
+              </a:solidFill>
+            </a:ln>
+          </p:spPr>
+          <p:txBody>
+            <a:bodyPr wrap="square" rtlCol="0">
+              <a:spAutoFit/>
+            </a:bodyPr>
+            <a:lstStyle/>
+            <a:p>
+              <a:r>
+                <a:rPr lang="en-US" sz="1400">
+                  <a:latin typeface="Arial" panose="020B0604020202020204" pitchFamily="34" charset="0"/>
+                  <a:cs typeface="Arial" panose="020B0604020202020204" pitchFamily="34" charset="0"/>
+                </a:rPr>
+                <a:t>Ten,Ma_so,Ten_tieng_Anh,Don_gia,Trang_thai,Thoi_luong,Rating,Phan_loai,Quoc_gia,Dao_dien,Nha_san_xuat,The_loai,Dien_vien,Khoi_chieu.Noi_dung,Dich_thuat,</a:t>
+              </a:r>
+              <a:endParaRPr lang="en-US" sz="1400">
+                <a:latin typeface="Arial" panose="020B0604020202020204" pitchFamily="34" charset="0"/>
+                <a:cs typeface="Arial" panose="020B0604020202020204" pitchFamily="34" charset="0"/>
+              </a:endParaRPr>
+            </a:p>
+            <a:p>
+              <a:r>
+                <a:rPr lang="en-US" sz="1400">
+                  <a:solidFill>
+                    <a:schemeClr val="accent2"/>
+                  </a:solidFill>
+                  <a:latin typeface="Arial" panose="020B0604020202020204" pitchFamily="34" charset="0"/>
+                  <a:cs typeface="Arial" panose="020B0604020202020204" pitchFamily="34" charset="0"/>
+                </a:rPr>
+                <a:t>Danh_sach_Suat_chieu</a:t>
+              </a:r>
+              <a:r>
+                <a:rPr lang="en-US" sz="1400">
+                  <a:solidFill>
+                    <a:srgbClr val="FF0000"/>
+                  </a:solidFill>
+                  <a:latin typeface="Arial" panose="020B0604020202020204" pitchFamily="34" charset="0"/>
+                  <a:cs typeface="Arial" panose="020B0604020202020204" pitchFamily="34" charset="0"/>
+                </a:rPr>
+                <a:t>: </a:t>
+              </a:r>
+              <a:r>
+                <a:rPr lang="en-US" sz="1400">
+                  <a:solidFill>
+                    <a:schemeClr val="tx1"/>
+                  </a:solidFill>
+                  <a:latin typeface="Arial" panose="020B0604020202020204" pitchFamily="34" charset="0"/>
+                  <a:cs typeface="Arial" panose="020B0604020202020204" pitchFamily="34" charset="0"/>
+                </a:rPr>
+                <a:t>Ma_so, Bat_dau, </a:t>
+              </a:r>
+              <a:r>
+                <a:rPr lang="en-US" sz="1400">
+                  <a:solidFill>
+                    <a:schemeClr val="accent2"/>
+                  </a:solidFill>
+                  <a:latin typeface="Arial" panose="020B0604020202020204" pitchFamily="34" charset="0"/>
+                  <a:cs typeface="Arial" panose="020B0604020202020204" pitchFamily="34" charset="0"/>
+                </a:rPr>
+                <a:t>Danh_sach_Ghe_trong</a:t>
+              </a:r>
+              <a:r>
+                <a:rPr lang="en-US" sz="1400">
+                  <a:solidFill>
+                    <a:schemeClr val="tx1"/>
+                  </a:solidFill>
+                  <a:latin typeface="Arial" panose="020B0604020202020204" pitchFamily="34" charset="0"/>
+                  <a:cs typeface="Arial" panose="020B0604020202020204" pitchFamily="34" charset="0"/>
+                </a:rPr>
+                <a:t>, Rap, Phong_chieu</a:t>
+              </a:r>
+              <a:endParaRPr lang="en-US" sz="1400">
+                <a:latin typeface="Arial" panose="020B0604020202020204" pitchFamily="34" charset="0"/>
+                <a:cs typeface="Arial" panose="020B0604020202020204" pitchFamily="34" charset="0"/>
+                <a:sym typeface="+mn-ea"/>
+              </a:endParaRPr>
+            </a:p>
+          </p:txBody>
+        </p:sp>
+      </p:grpSp>
+      <p:sp>
+        <p:nvSpPr>
+          <p:cNvPr id="41" name="TextBox 25"/>
+          <p:cNvSpPr txBox="1"/>
+          <p:nvPr/>
+        </p:nvSpPr>
+        <p:spPr>
+          <a:xfrm>
+            <a:off x="6165850" y="1249680"/>
+            <a:ext cx="5204460" cy="337185"/>
+          </a:xfrm>
+          <a:prstGeom prst="rect">
+            <a:avLst/>
+          </a:prstGeom>
+          <a:noFill/>
+          <a:ln>
+            <a:solidFill>
+              <a:schemeClr val="tx1"/>
+            </a:solidFill>
+          </a:ln>
+        </p:spPr>
+        <p:txBody>
+          <a:bodyPr wrap="square" rtlCol="0">
+            <a:spAutoFit/>
+          </a:bodyPr>
+          <a:p>
+            <a:pPr algn="ctr"/>
+            <a:r>
+              <a:rPr lang="en-US" sz="1600" b="1" smtClean="0">
+                <a:solidFill>
+                  <a:srgbClr val="002060"/>
+                </a:solidFill>
+                <a:latin typeface="Arial" panose="020B0604020202020204" pitchFamily="34" charset="0"/>
+                <a:cs typeface="Arial" panose="020B0604020202020204" pitchFamily="34" charset="0"/>
+              </a:rPr>
+              <a:t>XL_NGUOI_DUNG_NOI_BO</a:t>
+            </a:r>
+            <a:endParaRPr lang="en-US" sz="1600" b="1" smtClean="0">
               <a:solidFill>
                 <a:srgbClr val="002060"/>
               </a:solidFill>
@@ -4463,38 +7245,951 @@
           </a:p>
         </p:txBody>
       </p:sp>
-      <p:pic>
-        <p:nvPicPr>
-          <p:cNvPr id="71" name="Picture 70">
-            <a:hlinkClick r:id="" action="ppaction://noaction"/>
-          </p:cNvPr>
-          <p:cNvPicPr>
-            <a:picLocks noChangeAspect="1"/>
-          </p:cNvPicPr>
+      <p:sp>
+        <p:nvSpPr>
+          <p:cNvPr id="42" name="TextBox 26"/>
+          <p:cNvSpPr txBox="1"/>
           <p:nvPr/>
-        </p:nvPicPr>
-        <p:blipFill>
-          <a:blip r:embed="rId2">
-            <a:extLst>
-              <a:ext uri="{28A0092B-C50C-407E-A947-70E740481C1C}">
-                <a14:useLocalDpi xmlns:a14="http://schemas.microsoft.com/office/drawing/2010/main" val="0"/>
-              </a:ext>
-            </a:extLst>
-          </a:blip>
-          <a:stretch>
-            <a:fillRect/>
-          </a:stretch>
-        </p:blipFill>
-        <p:spPr>
-          <a:xfrm>
-            <a:off x="3816588" y="5287749"/>
-            <a:ext cx="562698" cy="453082"/>
+        </p:nvSpPr>
+        <p:spPr>
+          <a:xfrm>
+            <a:off x="6165850" y="1586865"/>
+            <a:ext cx="5204460" cy="737235"/>
           </a:xfrm>
           <a:prstGeom prst="rect">
             <a:avLst/>
           </a:prstGeom>
-        </p:spPr>
-      </p:pic>
+          <a:noFill/>
+          <a:ln>
+            <a:solidFill>
+              <a:schemeClr val="tx1"/>
+            </a:solidFill>
+          </a:ln>
+        </p:spPr>
+        <p:txBody>
+          <a:bodyPr wrap="square" rtlCol="0">
+            <a:spAutoFit/>
+          </a:bodyPr>
+          <a:p>
+            <a:r>
+              <a:rPr lang="en-US" sz="1400" smtClean="0">
+                <a:latin typeface="Arial" panose="020B0604020202020204" pitchFamily="34" charset="0"/>
+                <a:cs typeface="Arial" panose="020B0604020202020204" pitchFamily="34" charset="0"/>
+                <a:sym typeface="+mn-ea"/>
+              </a:rPr>
+              <a:t>Ho_ten,Ma_so, Ten_Dang_nhap,Mat_khau, </a:t>
+            </a:r>
+            <a:r>
+              <a:rPr lang="en-US" sz="1400" smtClean="0">
+                <a:solidFill>
+                  <a:schemeClr val="accent2"/>
+                </a:solidFill>
+                <a:latin typeface="Arial" panose="020B0604020202020204" pitchFamily="34" charset="0"/>
+                <a:cs typeface="Arial" panose="020B0604020202020204" pitchFamily="34" charset="0"/>
+                <a:sym typeface="+mn-ea"/>
+              </a:rPr>
+              <a:t>Nhom_Nguoi_dung: </a:t>
+            </a:r>
+            <a:r>
+              <a:rPr lang="en-US" sz="1400" smtClean="0">
+                <a:solidFill>
+                  <a:schemeClr val="tx1"/>
+                </a:solidFill>
+                <a:latin typeface="Arial" panose="020B0604020202020204" pitchFamily="34" charset="0"/>
+                <a:cs typeface="Arial" panose="020B0604020202020204" pitchFamily="34" charset="0"/>
+                <a:sym typeface="+mn-ea"/>
+              </a:rPr>
+              <a:t>Ten, Ma_so, Dia_chi_Dang_nhap</a:t>
+            </a:r>
+            <a:endParaRPr lang="en-US" sz="1400" smtClean="0">
+              <a:solidFill>
+                <a:schemeClr val="tx1"/>
+              </a:solidFill>
+              <a:latin typeface="Arial" panose="020B0604020202020204" pitchFamily="34" charset="0"/>
+              <a:cs typeface="Arial" panose="020B0604020202020204" pitchFamily="34" charset="0"/>
+              <a:sym typeface="+mn-ea"/>
+            </a:endParaRPr>
+          </a:p>
+          <a:p>
+            <a:r>
+              <a:rPr lang="en-US" sz="1400" smtClean="0">
+                <a:solidFill>
+                  <a:schemeClr val="accent2"/>
+                </a:solidFill>
+                <a:latin typeface="Arial" panose="020B0604020202020204" pitchFamily="34" charset="0"/>
+                <a:cs typeface="Arial" panose="020B0604020202020204" pitchFamily="34" charset="0"/>
+                <a:sym typeface="+mn-ea"/>
+              </a:rPr>
+              <a:t>Rap: </a:t>
+            </a:r>
+            <a:r>
+              <a:rPr lang="en-US" sz="1400" smtClean="0">
+                <a:solidFill>
+                  <a:schemeClr val="tx1"/>
+                </a:solidFill>
+                <a:latin typeface="Arial" panose="020B0604020202020204" pitchFamily="34" charset="0"/>
+                <a:cs typeface="Arial" panose="020B0604020202020204" pitchFamily="34" charset="0"/>
+                <a:sym typeface="+mn-ea"/>
+              </a:rPr>
+              <a:t>Ma_so, Ten, So_ghe, Danh_sach_Phong_chieu</a:t>
+            </a:r>
+            <a:endParaRPr lang="en-US" sz="1400" smtClean="0">
+              <a:solidFill>
+                <a:schemeClr val="tx1"/>
+              </a:solidFill>
+              <a:latin typeface="Arial" panose="020B0604020202020204" pitchFamily="34" charset="0"/>
+              <a:cs typeface="Arial" panose="020B0604020202020204" pitchFamily="34" charset="0"/>
+              <a:sym typeface="+mn-ea"/>
+            </a:endParaRPr>
+          </a:p>
+        </p:txBody>
+      </p:sp>
+      <p:sp>
+        <p:nvSpPr>
+          <p:cNvPr id="43" name="TextBox 25"/>
+          <p:cNvSpPr txBox="1"/>
+          <p:nvPr/>
+        </p:nvSpPr>
+        <p:spPr>
+          <a:xfrm>
+            <a:off x="6134735" y="2432050"/>
+            <a:ext cx="5204460" cy="337185"/>
+          </a:xfrm>
+          <a:prstGeom prst="rect">
+            <a:avLst/>
+          </a:prstGeom>
+          <a:noFill/>
+          <a:ln>
+            <a:solidFill>
+              <a:schemeClr val="tx1"/>
+            </a:solidFill>
+          </a:ln>
+        </p:spPr>
+        <p:txBody>
+          <a:bodyPr wrap="square" rtlCol="0">
+            <a:spAutoFit/>
+          </a:bodyPr>
+          <a:p>
+            <a:pPr algn="ctr"/>
+            <a:r>
+              <a:rPr lang="en-US" sz="1600" b="1" smtClean="0">
+                <a:solidFill>
+                  <a:srgbClr val="002060"/>
+                </a:solidFill>
+                <a:latin typeface="Arial" panose="020B0604020202020204" pitchFamily="34" charset="0"/>
+                <a:cs typeface="Arial" panose="020B0604020202020204" pitchFamily="34" charset="0"/>
+              </a:rPr>
+              <a:t>XL_NGUOI_DUNG_KHACH_THAM_QUAN</a:t>
+            </a:r>
+            <a:endParaRPr lang="en-US" sz="1600" b="1" smtClean="0">
+              <a:solidFill>
+                <a:srgbClr val="002060"/>
+              </a:solidFill>
+              <a:latin typeface="Arial" panose="020B0604020202020204" pitchFamily="34" charset="0"/>
+              <a:cs typeface="Arial" panose="020B0604020202020204" pitchFamily="34" charset="0"/>
+            </a:endParaRPr>
+          </a:p>
+        </p:txBody>
+      </p:sp>
+      <p:sp>
+        <p:nvSpPr>
+          <p:cNvPr id="44" name="TextBox 26"/>
+          <p:cNvSpPr txBox="1"/>
+          <p:nvPr/>
+        </p:nvSpPr>
+        <p:spPr>
+          <a:xfrm>
+            <a:off x="6134735" y="2770505"/>
+            <a:ext cx="5204460" cy="306705"/>
+          </a:xfrm>
+          <a:prstGeom prst="rect">
+            <a:avLst/>
+          </a:prstGeom>
+          <a:noFill/>
+          <a:ln>
+            <a:solidFill>
+              <a:schemeClr val="tx1"/>
+            </a:solidFill>
+          </a:ln>
+        </p:spPr>
+        <p:txBody>
+          <a:bodyPr wrap="square" rtlCol="0">
+            <a:spAutoFit/>
+          </a:bodyPr>
+          <a:p>
+            <a:r>
+              <a:rPr lang="en-US" sz="1400" smtClean="0">
+                <a:latin typeface="Arial" panose="020B0604020202020204" pitchFamily="34" charset="0"/>
+                <a:cs typeface="Arial" panose="020B0604020202020204" pitchFamily="34" charset="0"/>
+                <a:sym typeface="+mn-ea"/>
+              </a:rPr>
+              <a:t>Ho_ten,Ma_so, Số điện thoại ,email</a:t>
+            </a:r>
+            <a:endParaRPr lang="en-US" sz="1400">
+              <a:latin typeface="Arial" panose="020B0604020202020204" pitchFamily="34" charset="0"/>
+              <a:cs typeface="Arial" panose="020B0604020202020204" pitchFamily="34" charset="0"/>
+            </a:endParaRPr>
+          </a:p>
+        </p:txBody>
+      </p:sp>
+      <p:grpSp>
+        <p:nvGrpSpPr>
+          <p:cNvPr id="48" name="Group 47"/>
+          <p:cNvGrpSpPr/>
+          <p:nvPr/>
+        </p:nvGrpSpPr>
+        <p:grpSpPr>
+          <a:xfrm>
+            <a:off x="330153" y="3938720"/>
+            <a:ext cx="4107738" cy="1074519"/>
+            <a:chOff x="903567" y="2937671"/>
+            <a:chExt cx="1767100" cy="1074519"/>
+          </a:xfrm>
+        </p:grpSpPr>
+        <p:sp>
+          <p:nvSpPr>
+            <p:cNvPr id="49" name="TextBox 25"/>
+            <p:cNvSpPr txBox="1"/>
+            <p:nvPr/>
+          </p:nvSpPr>
+          <p:spPr>
+            <a:xfrm>
+              <a:off x="903567" y="2937671"/>
+              <a:ext cx="1767100" cy="337185"/>
+            </a:xfrm>
+            <a:prstGeom prst="rect">
+              <a:avLst/>
+            </a:prstGeom>
+            <a:noFill/>
+            <a:ln>
+              <a:solidFill>
+                <a:schemeClr val="tx1"/>
+              </a:solidFill>
+            </a:ln>
+          </p:spPr>
+          <p:txBody>
+            <a:bodyPr wrap="square" rtlCol="0">
+              <a:spAutoFit/>
+            </a:bodyPr>
+            <a:p>
+              <a:pPr algn="ctr"/>
+              <a:r>
+                <a:rPr lang="en-US" sz="1600" b="1">
+                  <a:solidFill>
+                    <a:srgbClr val="002060"/>
+                  </a:solidFill>
+                  <a:latin typeface="Arial" panose="020B0604020202020204" pitchFamily="34" charset="0"/>
+                  <a:cs typeface="Arial" panose="020B0604020202020204" pitchFamily="34" charset="0"/>
+                </a:rPr>
+                <a:t>XL_DAT_VE</a:t>
+              </a:r>
+              <a:endParaRPr lang="en-US" sz="1600" b="1">
+                <a:latin typeface="Arial" panose="020B0604020202020204" pitchFamily="34" charset="0"/>
+                <a:cs typeface="Arial" panose="020B0604020202020204" pitchFamily="34" charset="0"/>
+              </a:endParaRPr>
+            </a:p>
+          </p:txBody>
+        </p:sp>
+        <p:sp>
+          <p:nvSpPr>
+            <p:cNvPr id="50" name="TextBox 26"/>
+            <p:cNvSpPr txBox="1"/>
+            <p:nvPr/>
+          </p:nvSpPr>
+          <p:spPr>
+            <a:xfrm>
+              <a:off x="903567" y="3274955"/>
+              <a:ext cx="1767100" cy="737235"/>
+            </a:xfrm>
+            <a:prstGeom prst="rect">
+              <a:avLst/>
+            </a:prstGeom>
+            <a:noFill/>
+            <a:ln>
+              <a:solidFill>
+                <a:schemeClr val="tx1"/>
+              </a:solidFill>
+            </a:ln>
+          </p:spPr>
+          <p:txBody>
+            <a:bodyPr wrap="square" rtlCol="0">
+              <a:spAutoFit/>
+            </a:bodyPr>
+            <a:p>
+              <a:r>
+                <a:rPr lang="en-US" sz="1400">
+                  <a:latin typeface="Arial" panose="020B0604020202020204" pitchFamily="34" charset="0"/>
+                  <a:cs typeface="Arial" panose="020B0604020202020204" pitchFamily="34" charset="0"/>
+                </a:rPr>
+                <a:t>Ten,Ma_so,Dien_thoai,Dia_chi</a:t>
+              </a:r>
+              <a:endParaRPr lang="en-US" sz="1400">
+                <a:latin typeface="Arial" panose="020B0604020202020204" pitchFamily="34" charset="0"/>
+                <a:cs typeface="Arial" panose="020B0604020202020204" pitchFamily="34" charset="0"/>
+              </a:endParaRPr>
+            </a:p>
+            <a:p>
+              <a:r>
+                <a:rPr lang="en-US" sz="1400">
+                  <a:solidFill>
+                    <a:schemeClr val="accent2"/>
+                  </a:solidFill>
+                  <a:latin typeface="Arial" panose="020B0604020202020204" pitchFamily="34" charset="0"/>
+                  <a:cs typeface="Arial" panose="020B0604020202020204" pitchFamily="34" charset="0"/>
+                </a:rPr>
+                <a:t>Danh_sach_Rap</a:t>
+              </a:r>
+              <a:endParaRPr lang="en-US" sz="1400">
+                <a:solidFill>
+                  <a:schemeClr val="accent2"/>
+                </a:solidFill>
+                <a:latin typeface="Arial" panose="020B0604020202020204" pitchFamily="34" charset="0"/>
+                <a:cs typeface="Arial" panose="020B0604020202020204" pitchFamily="34" charset="0"/>
+              </a:endParaRPr>
+            </a:p>
+            <a:p>
+              <a:r>
+                <a:rPr lang="en-US" sz="1400">
+                  <a:solidFill>
+                    <a:schemeClr val="accent2"/>
+                  </a:solidFill>
+                  <a:latin typeface="Arial" panose="020B0604020202020204" pitchFamily="34" charset="0"/>
+                  <a:cs typeface="Arial" panose="020B0604020202020204" pitchFamily="34" charset="0"/>
+                </a:rPr>
+                <a:t>Danh_sach_Phong_chieu</a:t>
+              </a:r>
+              <a:endParaRPr lang="en-US" sz="1400">
+                <a:solidFill>
+                  <a:schemeClr val="accent2"/>
+                </a:solidFill>
+                <a:latin typeface="Arial" panose="020B0604020202020204" pitchFamily="34" charset="0"/>
+                <a:cs typeface="Arial" panose="020B0604020202020204" pitchFamily="34" charset="0"/>
+              </a:endParaRPr>
+            </a:p>
+          </p:txBody>
+        </p:sp>
+      </p:grpSp>
+      <p:sp>
+        <p:nvSpPr>
+          <p:cNvPr id="51" name="TextBox 25"/>
+          <p:cNvSpPr txBox="1"/>
+          <p:nvPr/>
+        </p:nvSpPr>
+        <p:spPr>
+          <a:xfrm>
+            <a:off x="6134735" y="3260090"/>
+            <a:ext cx="5170170" cy="337185"/>
+          </a:xfrm>
+          <a:prstGeom prst="rect">
+            <a:avLst/>
+          </a:prstGeom>
+          <a:noFill/>
+          <a:ln>
+            <a:solidFill>
+              <a:schemeClr val="tx1"/>
+            </a:solidFill>
+          </a:ln>
+        </p:spPr>
+        <p:txBody>
+          <a:bodyPr wrap="square" rtlCol="0">
+            <a:spAutoFit/>
+          </a:bodyPr>
+          <a:p>
+            <a:pPr algn="ctr"/>
+            <a:r>
+              <a:rPr lang="en-US" sz="1600" b="1" smtClean="0">
+                <a:solidFill>
+                  <a:srgbClr val="002060"/>
+                </a:solidFill>
+                <a:latin typeface="Arial" panose="020B0604020202020204" pitchFamily="34" charset="0"/>
+                <a:cs typeface="Arial" panose="020B0604020202020204" pitchFamily="34" charset="0"/>
+              </a:rPr>
+              <a:t>XL_NGUOI_DUNG</a:t>
+            </a:r>
+            <a:endParaRPr lang="en-US" sz="1600" b="1" smtClean="0">
+              <a:solidFill>
+                <a:srgbClr val="002060"/>
+              </a:solidFill>
+              <a:latin typeface="Arial" panose="020B0604020202020204" pitchFamily="34" charset="0"/>
+              <a:cs typeface="Arial" panose="020B0604020202020204" pitchFamily="34" charset="0"/>
+            </a:endParaRPr>
+          </a:p>
+        </p:txBody>
+      </p:sp>
+      <p:sp>
+        <p:nvSpPr>
+          <p:cNvPr id="52" name="TextBox 26"/>
+          <p:cNvSpPr txBox="1"/>
+          <p:nvPr/>
+        </p:nvSpPr>
+        <p:spPr>
+          <a:xfrm>
+            <a:off x="6134735" y="3598545"/>
+            <a:ext cx="5170170" cy="1168400"/>
+          </a:xfrm>
+          <a:prstGeom prst="rect">
+            <a:avLst/>
+          </a:prstGeom>
+          <a:noFill/>
+          <a:ln>
+            <a:solidFill>
+              <a:schemeClr val="tx1"/>
+            </a:solidFill>
+          </a:ln>
+        </p:spPr>
+        <p:txBody>
+          <a:bodyPr wrap="square" rtlCol="0">
+            <a:spAutoFit/>
+          </a:bodyPr>
+          <a:p>
+            <a:r>
+              <a:rPr lang="en-US" sz="1400" smtClean="0">
+                <a:latin typeface="Arial" panose="020B0604020202020204" pitchFamily="34" charset="0"/>
+                <a:cs typeface="Arial" panose="020B0604020202020204" pitchFamily="34" charset="0"/>
+                <a:sym typeface="+mn-ea"/>
+              </a:rPr>
+              <a:t>Ho_ten,Ma_so, Số điện thoại ,email</a:t>
+            </a:r>
+            <a:endParaRPr lang="en-US" sz="1400" smtClean="0">
+              <a:latin typeface="Arial" panose="020B0604020202020204" pitchFamily="34" charset="0"/>
+              <a:cs typeface="Arial" panose="020B0604020202020204" pitchFamily="34" charset="0"/>
+              <a:sym typeface="+mn-ea"/>
+            </a:endParaRPr>
+          </a:p>
+          <a:p>
+            <a:r>
+              <a:rPr lang="en-US" sz="1400">
+                <a:solidFill>
+                  <a:schemeClr val="accent2"/>
+                </a:solidFill>
+                <a:latin typeface="Arial" panose="020B0604020202020204" pitchFamily="34" charset="0"/>
+                <a:cs typeface="Arial" panose="020B0604020202020204" pitchFamily="34" charset="0"/>
+              </a:rPr>
+              <a:t>Danh_sach_Phim_xem</a:t>
+            </a:r>
+            <a:endParaRPr lang="en-US" sz="1400">
+              <a:solidFill>
+                <a:schemeClr val="accent2"/>
+              </a:solidFill>
+              <a:latin typeface="Arial" panose="020B0604020202020204" pitchFamily="34" charset="0"/>
+              <a:cs typeface="Arial" panose="020B0604020202020204" pitchFamily="34" charset="0"/>
+            </a:endParaRPr>
+          </a:p>
+          <a:p>
+            <a:r>
+              <a:rPr lang="en-US" sz="1400">
+                <a:solidFill>
+                  <a:schemeClr val="accent2"/>
+                </a:solidFill>
+                <a:latin typeface="Arial" panose="020B0604020202020204" pitchFamily="34" charset="0"/>
+                <a:cs typeface="Arial" panose="020B0604020202020204" pitchFamily="34" charset="0"/>
+              </a:rPr>
+              <a:t>Danh_sach_Rap</a:t>
+            </a:r>
+            <a:endParaRPr lang="en-US" sz="1400">
+              <a:solidFill>
+                <a:schemeClr val="accent2"/>
+              </a:solidFill>
+              <a:latin typeface="Arial" panose="020B0604020202020204" pitchFamily="34" charset="0"/>
+              <a:cs typeface="Arial" panose="020B0604020202020204" pitchFamily="34" charset="0"/>
+            </a:endParaRPr>
+          </a:p>
+          <a:p>
+            <a:r>
+              <a:rPr lang="en-US" sz="1400">
+                <a:solidFill>
+                  <a:schemeClr val="accent2"/>
+                </a:solidFill>
+                <a:latin typeface="Arial" panose="020B0604020202020204" pitchFamily="34" charset="0"/>
+                <a:cs typeface="Arial" panose="020B0604020202020204" pitchFamily="34" charset="0"/>
+              </a:rPr>
+              <a:t>Phim_chon: </a:t>
+            </a:r>
+            <a:r>
+              <a:rPr lang="en-US" sz="1400">
+                <a:solidFill>
+                  <a:schemeClr val="tx1"/>
+                </a:solidFill>
+                <a:latin typeface="Arial" panose="020B0604020202020204" pitchFamily="34" charset="0"/>
+                <a:cs typeface="Arial" panose="020B0604020202020204" pitchFamily="34" charset="0"/>
+              </a:rPr>
+              <a:t>XL_PHIM</a:t>
+            </a:r>
+            <a:endParaRPr lang="en-US" sz="1400">
+              <a:solidFill>
+                <a:schemeClr val="tx1"/>
+              </a:solidFill>
+              <a:latin typeface="Arial" panose="020B0604020202020204" pitchFamily="34" charset="0"/>
+              <a:cs typeface="Arial" panose="020B0604020202020204" pitchFamily="34" charset="0"/>
+            </a:endParaRPr>
+          </a:p>
+          <a:p>
+            <a:r>
+              <a:rPr lang="en-US" sz="1400">
+                <a:solidFill>
+                  <a:schemeClr val="accent2"/>
+                </a:solidFill>
+                <a:latin typeface="Arial" panose="020B0604020202020204" pitchFamily="34" charset="0"/>
+                <a:cs typeface="Arial" panose="020B0604020202020204" pitchFamily="34" charset="0"/>
+              </a:rPr>
+              <a:t>Dat_ve</a:t>
+            </a:r>
+            <a:r>
+              <a:rPr lang="en-US" sz="1400">
+                <a:latin typeface="Arial" panose="020B0604020202020204" pitchFamily="34" charset="0"/>
+                <a:cs typeface="Arial" panose="020B0604020202020204" pitchFamily="34" charset="0"/>
+              </a:rPr>
+              <a:t>: XL_DAT_VE</a:t>
+            </a:r>
+            <a:endParaRPr lang="en-US" sz="1400">
+              <a:latin typeface="Arial" panose="020B0604020202020204" pitchFamily="34" charset="0"/>
+              <a:cs typeface="Arial" panose="020B0604020202020204" pitchFamily="34" charset="0"/>
+            </a:endParaRPr>
+          </a:p>
+        </p:txBody>
+      </p:sp>
+      <p:grpSp>
+        <p:nvGrpSpPr>
+          <p:cNvPr id="53" name="Group 52"/>
+          <p:cNvGrpSpPr/>
+          <p:nvPr/>
+        </p:nvGrpSpPr>
+        <p:grpSpPr>
+          <a:xfrm>
+            <a:off x="330153" y="5072195"/>
+            <a:ext cx="9943388" cy="1851759"/>
+            <a:chOff x="903567" y="2806861"/>
+            <a:chExt cx="4277527" cy="1851759"/>
+          </a:xfrm>
+        </p:grpSpPr>
+        <p:sp>
+          <p:nvSpPr>
+            <p:cNvPr id="54" name="TextBox 25"/>
+            <p:cNvSpPr txBox="1"/>
+            <p:nvPr/>
+          </p:nvSpPr>
+          <p:spPr>
+            <a:xfrm>
+              <a:off x="903567" y="2937671"/>
+              <a:ext cx="1767100" cy="337185"/>
+            </a:xfrm>
+            <a:prstGeom prst="rect">
+              <a:avLst/>
+            </a:prstGeom>
+            <a:noFill/>
+            <a:ln>
+              <a:solidFill>
+                <a:schemeClr val="tx1"/>
+              </a:solidFill>
+            </a:ln>
+          </p:spPr>
+          <p:txBody>
+            <a:bodyPr wrap="square" rtlCol="0">
+              <a:spAutoFit/>
+            </a:bodyPr>
+            <a:p>
+              <a:pPr algn="ctr"/>
+              <a:r>
+                <a:rPr lang="en-US" sz="1600" b="1">
+                  <a:solidFill>
+                    <a:srgbClr val="002060"/>
+                  </a:solidFill>
+                  <a:latin typeface="Arial" panose="020B0604020202020204" pitchFamily="34" charset="0"/>
+                  <a:cs typeface="Arial" panose="020B0604020202020204" pitchFamily="34" charset="0"/>
+                </a:rPr>
+                <a:t>XL_SUAT_CHIEU</a:t>
+              </a:r>
+              <a:endParaRPr lang="en-US" sz="1600" b="1">
+                <a:latin typeface="Arial" panose="020B0604020202020204" pitchFamily="34" charset="0"/>
+                <a:cs typeface="Arial" panose="020B0604020202020204" pitchFamily="34" charset="0"/>
+              </a:endParaRPr>
+            </a:p>
+          </p:txBody>
+        </p:sp>
+        <p:sp>
+          <p:nvSpPr>
+            <p:cNvPr id="55" name="TextBox 26"/>
+            <p:cNvSpPr txBox="1"/>
+            <p:nvPr/>
+          </p:nvSpPr>
+          <p:spPr>
+            <a:xfrm>
+              <a:off x="903567" y="3274955"/>
+              <a:ext cx="1767100" cy="1383665"/>
+            </a:xfrm>
+            <a:prstGeom prst="rect">
+              <a:avLst/>
+            </a:prstGeom>
+            <a:noFill/>
+            <a:ln>
+              <a:solidFill>
+                <a:schemeClr val="tx1"/>
+              </a:solidFill>
+            </a:ln>
+          </p:spPr>
+          <p:txBody>
+            <a:bodyPr wrap="square" rtlCol="0">
+              <a:spAutoFit/>
+            </a:bodyPr>
+            <a:p>
+              <a:r>
+                <a:rPr lang="en-US" sz="1400">
+                  <a:latin typeface="Arial" panose="020B0604020202020204" pitchFamily="34" charset="0"/>
+                  <a:cs typeface="Arial" panose="020B0604020202020204" pitchFamily="34" charset="0"/>
+                  <a:sym typeface="+mn-ea"/>
+                </a:rPr>
+                <a:t>Ma_so, Bat_dau, </a:t>
+              </a:r>
+              <a:endParaRPr lang="en-US" sz="1400">
+                <a:latin typeface="Arial" panose="020B0604020202020204" pitchFamily="34" charset="0"/>
+                <a:cs typeface="Arial" panose="020B0604020202020204" pitchFamily="34" charset="0"/>
+                <a:sym typeface="+mn-ea"/>
+              </a:endParaRPr>
+            </a:p>
+            <a:p>
+              <a:r>
+                <a:rPr lang="en-US" sz="1400">
+                  <a:solidFill>
+                    <a:schemeClr val="accent2"/>
+                  </a:solidFill>
+                  <a:latin typeface="Arial" panose="020B0604020202020204" pitchFamily="34" charset="0"/>
+                  <a:cs typeface="Arial" panose="020B0604020202020204" pitchFamily="34" charset="0"/>
+                  <a:sym typeface="+mn-ea"/>
+                </a:rPr>
+                <a:t>Danh_sach_Ghe_trong</a:t>
+              </a:r>
+              <a:r>
+                <a:rPr lang="en-US" sz="1400">
+                  <a:latin typeface="Arial" panose="020B0604020202020204" pitchFamily="34" charset="0"/>
+                  <a:cs typeface="Arial" panose="020B0604020202020204" pitchFamily="34" charset="0"/>
+                  <a:sym typeface="+mn-ea"/>
+                </a:rPr>
+                <a:t>, </a:t>
+              </a:r>
+              <a:endParaRPr lang="en-US" sz="1400">
+                <a:latin typeface="Arial" panose="020B0604020202020204" pitchFamily="34" charset="0"/>
+                <a:cs typeface="Arial" panose="020B0604020202020204" pitchFamily="34" charset="0"/>
+                <a:sym typeface="+mn-ea"/>
+              </a:endParaRPr>
+            </a:p>
+            <a:p>
+              <a:r>
+                <a:rPr lang="en-US" sz="1400" smtClean="0">
+                  <a:solidFill>
+                    <a:schemeClr val="accent2"/>
+                  </a:solidFill>
+                  <a:latin typeface="Arial" panose="020B0604020202020204" pitchFamily="34" charset="0"/>
+                  <a:cs typeface="Arial" panose="020B0604020202020204" pitchFamily="34" charset="0"/>
+                  <a:sym typeface="+mn-ea"/>
+                </a:rPr>
+                <a:t>Rap: </a:t>
+              </a:r>
+              <a:r>
+                <a:rPr lang="en-US" sz="1400" smtClean="0">
+                  <a:latin typeface="Arial" panose="020B0604020202020204" pitchFamily="34" charset="0"/>
+                  <a:cs typeface="Arial" panose="020B0604020202020204" pitchFamily="34" charset="0"/>
+                  <a:sym typeface="+mn-ea"/>
+                </a:rPr>
+                <a:t>Ma_so, Ten, So_ghe, Danh_sach_Phong_chieu</a:t>
+              </a:r>
+              <a:r>
+                <a:rPr lang="en-US" sz="1400">
+                  <a:latin typeface="Arial" panose="020B0604020202020204" pitchFamily="34" charset="0"/>
+                  <a:cs typeface="Arial" panose="020B0604020202020204" pitchFamily="34" charset="0"/>
+                  <a:sym typeface="+mn-ea"/>
+                </a:rPr>
+                <a:t> </a:t>
+              </a:r>
+              <a:endParaRPr lang="en-US" sz="1400">
+                <a:latin typeface="Arial" panose="020B0604020202020204" pitchFamily="34" charset="0"/>
+                <a:cs typeface="Arial" panose="020B0604020202020204" pitchFamily="34" charset="0"/>
+                <a:sym typeface="+mn-ea"/>
+              </a:endParaRPr>
+            </a:p>
+            <a:p>
+              <a:r>
+                <a:rPr lang="en-US" sz="1400">
+                  <a:solidFill>
+                    <a:schemeClr val="accent2"/>
+                  </a:solidFill>
+                  <a:latin typeface="Arial" panose="020B0604020202020204" pitchFamily="34" charset="0"/>
+                  <a:cs typeface="Arial" panose="020B0604020202020204" pitchFamily="34" charset="0"/>
+                  <a:sym typeface="+mn-ea"/>
+                </a:rPr>
+                <a:t>Phong_chieu: </a:t>
+              </a:r>
+              <a:r>
+                <a:rPr lang="en-US" sz="1400">
+                  <a:solidFill>
+                    <a:schemeClr val="tx1"/>
+                  </a:solidFill>
+                  <a:latin typeface="Arial" panose="020B0604020202020204" pitchFamily="34" charset="0"/>
+                  <a:cs typeface="Arial" panose="020B0604020202020204" pitchFamily="34" charset="0"/>
+                  <a:sym typeface="+mn-ea"/>
+                </a:rPr>
+                <a:t>Ma_so, Ten, So_ghe, Danh_sach_Ghe</a:t>
+              </a:r>
+              <a:endParaRPr lang="en-US" sz="1400">
+                <a:solidFill>
+                  <a:schemeClr val="tx1"/>
+                </a:solidFill>
+                <a:latin typeface="Arial" panose="020B0604020202020204" pitchFamily="34" charset="0"/>
+                <a:cs typeface="Arial" panose="020B0604020202020204" pitchFamily="34" charset="0"/>
+                <a:sym typeface="+mn-ea"/>
+              </a:endParaRPr>
+            </a:p>
+          </p:txBody>
+        </p:sp>
+        <p:sp>
+          <p:nvSpPr>
+            <p:cNvPr id="56" name="TextBox 25"/>
+            <p:cNvSpPr txBox="1"/>
+            <p:nvPr/>
+          </p:nvSpPr>
+          <p:spPr>
+            <a:xfrm>
+              <a:off x="3413994" y="2806861"/>
+              <a:ext cx="1767100" cy="337185"/>
+            </a:xfrm>
+            <a:prstGeom prst="rect">
+              <a:avLst/>
+            </a:prstGeom>
+            <a:noFill/>
+            <a:ln>
+              <a:solidFill>
+                <a:schemeClr val="tx1"/>
+              </a:solidFill>
+            </a:ln>
+          </p:spPr>
+          <p:txBody>
+            <a:bodyPr wrap="square" rtlCol="0">
+              <a:spAutoFit/>
+            </a:bodyPr>
+            <a:p>
+              <a:pPr algn="ctr"/>
+              <a:r>
+                <a:rPr lang="en-US" sz="1600" b="1">
+                  <a:solidFill>
+                    <a:srgbClr val="002060"/>
+                  </a:solidFill>
+                  <a:latin typeface="Arial" panose="020B0604020202020204" pitchFamily="34" charset="0"/>
+                  <a:cs typeface="Arial" panose="020B0604020202020204" pitchFamily="34" charset="0"/>
+                </a:rPr>
+                <a:t>XL_GHE</a:t>
+              </a:r>
+              <a:endParaRPr lang="en-US" sz="1600" b="1">
+                <a:latin typeface="Arial" panose="020B0604020202020204" pitchFamily="34" charset="0"/>
+                <a:cs typeface="Arial" panose="020B0604020202020204" pitchFamily="34" charset="0"/>
+              </a:endParaRPr>
+            </a:p>
+          </p:txBody>
+        </p:sp>
+        <p:sp>
+          <p:nvSpPr>
+            <p:cNvPr id="57" name="TextBox 26"/>
+            <p:cNvSpPr txBox="1"/>
+            <p:nvPr/>
+          </p:nvSpPr>
+          <p:spPr>
+            <a:xfrm>
+              <a:off x="3413994" y="3144145"/>
+              <a:ext cx="1767100" cy="306705"/>
+            </a:xfrm>
+            <a:prstGeom prst="rect">
+              <a:avLst/>
+            </a:prstGeom>
+            <a:noFill/>
+            <a:ln>
+              <a:solidFill>
+                <a:schemeClr val="tx1"/>
+              </a:solidFill>
+            </a:ln>
+          </p:spPr>
+          <p:txBody>
+            <a:bodyPr wrap="square" rtlCol="0">
+              <a:spAutoFit/>
+            </a:bodyPr>
+            <a:p>
+              <a:r>
+                <a:rPr lang="en-US" sz="1400">
+                  <a:latin typeface="Arial" panose="020B0604020202020204" pitchFamily="34" charset="0"/>
+                  <a:cs typeface="Arial" panose="020B0604020202020204" pitchFamily="34" charset="0"/>
+                  <a:sym typeface="+mn-ea"/>
+                </a:rPr>
+                <a:t>Ma_so</a:t>
+              </a:r>
+              <a:endParaRPr lang="en-US" sz="1400">
+                <a:solidFill>
+                  <a:schemeClr val="tx1"/>
+                </a:solidFill>
+                <a:latin typeface="Arial" panose="020B0604020202020204" pitchFamily="34" charset="0"/>
+                <a:cs typeface="Arial" panose="020B0604020202020204" pitchFamily="34" charset="0"/>
+                <a:sym typeface="+mn-ea"/>
+              </a:endParaRPr>
+            </a:p>
+          </p:txBody>
+        </p:sp>
+      </p:grpSp>
+    </p:spTree>
+  </p:cSld>
+  <p:clrMapOvr>
+    <a:masterClrMapping/>
+  </p:clrMapOvr>
+</p:sld>
+</file>
+
+<file path=ppt/slides/slide6.xml><?xml version="1.0" encoding="utf-8"?>
+<p:sld xmlns:a="http://schemas.openxmlformats.org/drawingml/2006/main" xmlns:r="http://schemas.openxmlformats.org/officeDocument/2006/relationships" xmlns:p="http://schemas.openxmlformats.org/presentationml/2006/main">
+  <p:cSld>
+    <p:spTree>
+      <p:nvGrpSpPr>
+        <p:cNvPr id="1" name=""/>
+        <p:cNvGrpSpPr/>
+        <p:nvPr/>
+      </p:nvGrpSpPr>
+      <p:grpSpPr>
+        <a:xfrm>
+          <a:off x="0" y="0"/>
+          <a:ext cx="0" cy="0"/>
+          <a:chOff x="0" y="0"/>
+          <a:chExt cx="0" cy="0"/>
+        </a:xfrm>
+      </p:grpSpPr>
+      <p:sp>
+        <p:nvSpPr>
+          <p:cNvPr id="69" name="Rounded Rectangle 68">
+            <a:hlinkClick r:id="rId1" action="ppaction://hlinksldjump"/>
+          </p:cNvPr>
+          <p:cNvSpPr/>
+          <p:nvPr/>
+        </p:nvSpPr>
+        <p:spPr>
+          <a:xfrm>
+            <a:off x="2232941" y="256387"/>
+            <a:ext cx="6074929" cy="754401"/>
+          </a:xfrm>
+          <a:prstGeom prst="roundRect">
+            <a:avLst/>
+          </a:prstGeom>
+          <a:solidFill>
+            <a:srgbClr val="002060"/>
+          </a:solidFill>
+          <a:ln w="38100" cap="rnd">
+            <a:solidFill>
+              <a:schemeClr val="bg1"/>
+            </a:solidFill>
+          </a:ln>
+          <a:effectLst>
+            <a:outerShdw blurRad="482600" dir="5400000" sx="89000" sy="89000" algn="ctr" rotWithShape="0">
+              <a:srgbClr val="000000">
+                <a:alpha val="49000"/>
+              </a:srgbClr>
+            </a:outerShdw>
+          </a:effectLst>
+          <a:scene3d>
+            <a:camera prst="orthographicFront"/>
+            <a:lightRig rig="twoPt" dir="t"/>
+          </a:scene3d>
+          <a:sp3d extrusionH="12700" prstMaterial="translucentPowder">
+            <a:bevelB w="165100" prst="coolSlant"/>
+          </a:sp3d>
+        </p:spPr>
+        <p:style>
+          <a:lnRef idx="2">
+            <a:schemeClr val="accent1">
+              <a:shade val="50000"/>
+            </a:schemeClr>
+          </a:lnRef>
+          <a:fillRef idx="1">
+            <a:schemeClr val="accent1"/>
+          </a:fillRef>
+          <a:effectRef idx="0">
+            <a:schemeClr val="accent1"/>
+          </a:effectRef>
+          <a:fontRef idx="minor">
+            <a:schemeClr val="lt1"/>
+          </a:fontRef>
+        </p:style>
+        <p:txBody>
+          <a:bodyPr rtlCol="0" anchor="ctr"/>
+          <a:lstStyle/>
+          <a:p>
+            <a:pPr algn="ctr"/>
+            <a:r>
+              <a:rPr lang="en-US" sz="1600" b="1">
+                <a:solidFill>
+                  <a:prstClr val="white"/>
+                </a:solidFill>
+                <a:latin typeface="Arial" panose="020B0604020202020204" pitchFamily="34" charset="0"/>
+                <a:cs typeface="Arial" panose="020B0604020202020204" pitchFamily="34" charset="0"/>
+                <a:sym typeface="+mn-ea"/>
+              </a:rPr>
+              <a:t>Công ty Galaxy Cinema </a:t>
+            </a:r>
+            <a:r>
+              <a:rPr lang="en-US" sz="1600">
+                <a:solidFill>
+                  <a:prstClr val="white"/>
+                </a:solidFill>
+                <a:latin typeface="Arial" panose="020B0604020202020204" pitchFamily="34" charset="0"/>
+                <a:cs typeface="Arial" panose="020B0604020202020204" pitchFamily="34" charset="0"/>
+                <a:sym typeface="+mn-ea"/>
+              </a:rPr>
+              <a:t>( Mã số : </a:t>
+            </a:r>
+            <a:r>
+              <a:rPr lang="en-US" sz="1600">
+                <a:solidFill>
+                  <a:schemeClr val="bg1"/>
+                </a:solidFill>
+                <a:latin typeface="Arial" panose="020B0604020202020204" pitchFamily="34" charset="0"/>
+                <a:cs typeface="Arial" panose="020B0604020202020204" pitchFamily="34" charset="0"/>
+                <a:sym typeface="+mn-ea"/>
+              </a:rPr>
+              <a:t>Galaxy_Cinema</a:t>
+            </a:r>
+            <a:r>
+              <a:rPr lang="en-US" sz="1600">
+                <a:solidFill>
+                  <a:prstClr val="white"/>
+                </a:solidFill>
+                <a:latin typeface="Arial" panose="020B0604020202020204" pitchFamily="34" charset="0"/>
+                <a:cs typeface="Arial" panose="020B0604020202020204" pitchFamily="34" charset="0"/>
+                <a:sym typeface="+mn-ea"/>
+              </a:rPr>
+              <a:t>)</a:t>
+            </a:r>
+            <a:endParaRPr lang="en-US" sz="1600">
+              <a:solidFill>
+                <a:prstClr val="white"/>
+              </a:solidFill>
+              <a:latin typeface="Arial" panose="020B0604020202020204" pitchFamily="34" charset="0"/>
+              <a:cs typeface="Arial" panose="020B0604020202020204" pitchFamily="34" charset="0"/>
+            </a:endParaRPr>
+          </a:p>
+          <a:p>
+            <a:pPr algn="ctr"/>
+            <a:r>
+              <a:rPr lang="en-US" sz="1600" b="1">
+                <a:solidFill>
+                  <a:srgbClr val="FFFF00"/>
+                </a:solidFill>
+                <a:latin typeface="Arial" panose="020B0604020202020204" pitchFamily="34" charset="0"/>
+                <a:cs typeface="Arial" panose="020B0604020202020204" pitchFamily="34" charset="0"/>
+                <a:sym typeface="+mn-ea"/>
+              </a:rPr>
+              <a:t>2-Dữ liệu  </a:t>
+            </a:r>
+            <a:endParaRPr lang="vi-VN" sz="1600">
+              <a:solidFill>
+                <a:srgbClr val="FFFF00"/>
+              </a:solidFill>
+              <a:latin typeface="Arial" panose="020B0604020202020204" pitchFamily="34" charset="0"/>
+              <a:cs typeface="Arial" panose="020B0604020202020204" pitchFamily="34" charset="0"/>
+            </a:endParaRPr>
+          </a:p>
+        </p:txBody>
+      </p:sp>
       <p:sp>
         <p:nvSpPr>
           <p:cNvPr id="10" name="Cube 9">
@@ -5383,7 +9078,7 @@
         <p:spPr>
           <a:xfrm>
             <a:off x="5290726" y="2272773"/>
-            <a:ext cx="2355453" cy="737234"/>
+            <a:ext cx="2355453" cy="1168400"/>
           </a:xfrm>
           <a:prstGeom prst="rect">
             <a:avLst/>
@@ -5452,7 +9147,7 @@
               </a:rPr>
               <a:t> Danh_sach_Phim</a:t>
             </a:r>
-            <a:endParaRPr lang="en-US" sz="1400" b="1">
+            <a:endParaRPr lang="en-US" sz="1400">
               <a:solidFill>
                 <a:srgbClr val="002060"/>
               </a:solidFill>
@@ -5460,269 +9155,619 @@
               <a:cs typeface="Arial" panose="020B0604020202020204" pitchFamily="34" charset="0"/>
             </a:endParaRPr>
           </a:p>
-        </p:txBody>
-      </p:sp>
-      <p:grpSp>
-        <p:nvGrpSpPr>
-          <p:cNvPr id="4" name="Group 3"/>
-          <p:cNvGrpSpPr/>
-          <p:nvPr/>
-        </p:nvGrpSpPr>
-        <p:grpSpPr>
-          <a:xfrm>
-            <a:off x="338408" y="1010735"/>
-            <a:ext cx="4107738" cy="1074519"/>
-            <a:chOff x="903567" y="2937671"/>
-            <a:chExt cx="1767100" cy="1074519"/>
-          </a:xfrm>
-        </p:grpSpPr>
-        <p:sp>
-          <p:nvSpPr>
-            <p:cNvPr id="5" name="TextBox 25"/>
-            <p:cNvSpPr txBox="1"/>
-            <p:nvPr/>
-          </p:nvSpPr>
-          <p:spPr>
-            <a:xfrm>
-              <a:off x="903567" y="2937671"/>
-              <a:ext cx="1767100" cy="337185"/>
-            </a:xfrm>
-            <a:prstGeom prst="rect">
-              <a:avLst/>
-            </a:prstGeom>
-            <a:noFill/>
-            <a:ln>
-              <a:solidFill>
-                <a:schemeClr val="tx1"/>
-              </a:solidFill>
-            </a:ln>
-          </p:spPr>
-          <p:txBody>
-            <a:bodyPr wrap="square" rtlCol="0">
-              <a:spAutoFit/>
-            </a:bodyPr>
-            <a:lstStyle/>
-            <a:p>
-              <a:pPr algn="ctr"/>
-              <a:r>
-                <a:rPr lang="en-US" sz="1600" b="1">
-                  <a:solidFill>
-                    <a:srgbClr val="002060"/>
-                  </a:solidFill>
-                  <a:latin typeface="Arial" panose="020B0604020202020204" pitchFamily="34" charset="0"/>
-                  <a:cs typeface="Arial" panose="020B0604020202020204" pitchFamily="34" charset="0"/>
-                </a:rPr>
-                <a:t>XL_CONG_TY</a:t>
-              </a:r>
-              <a:endParaRPr lang="en-US" sz="1600" b="1">
+          <a:p>
+            <a:r>
+              <a:rPr lang="en-US" sz="1400">
+                <a:solidFill>
+                  <a:srgbClr val="002060"/>
+                </a:solidFill>
                 <a:latin typeface="Arial" panose="020B0604020202020204" pitchFamily="34" charset="0"/>
                 <a:cs typeface="Arial" panose="020B0604020202020204" pitchFamily="34" charset="0"/>
-              </a:endParaRPr>
-            </a:p>
-          </p:txBody>
-        </p:sp>
-        <p:sp>
-          <p:nvSpPr>
-            <p:cNvPr id="6" name="TextBox 26"/>
-            <p:cNvSpPr txBox="1"/>
-            <p:nvPr/>
-          </p:nvSpPr>
-          <p:spPr>
-            <a:xfrm>
-              <a:off x="903567" y="3274955"/>
-              <a:ext cx="1767100" cy="737235"/>
-            </a:xfrm>
-            <a:prstGeom prst="rect">
-              <a:avLst/>
-            </a:prstGeom>
-            <a:noFill/>
-            <a:ln>
+              </a:rPr>
+              <a:t>Danh_sach_Nguoi_dung_Noi_bo</a:t>
+            </a:r>
+            <a:endParaRPr lang="en-US" sz="1400">
               <a:solidFill>
-                <a:schemeClr val="tx1"/>
+                <a:srgbClr val="002060"/>
               </a:solidFill>
-            </a:ln>
-          </p:spPr>
-          <p:txBody>
-            <a:bodyPr wrap="square" rtlCol="0">
-              <a:spAutoFit/>
-            </a:bodyPr>
-            <a:lstStyle/>
-            <a:p>
-              <a:r>
-                <a:rPr lang="en-US" sz="1400">
-                  <a:latin typeface="Arial" panose="020B0604020202020204" pitchFamily="34" charset="0"/>
-                  <a:cs typeface="Arial" panose="020B0604020202020204" pitchFamily="34" charset="0"/>
-                </a:rPr>
-                <a:t>Ten,Ma_so,Dien_thoai,Dia_chi</a:t>
-              </a:r>
-              <a:endParaRPr lang="en-US" sz="1400">
-                <a:latin typeface="Arial" panose="020B0604020202020204" pitchFamily="34" charset="0"/>
-                <a:cs typeface="Arial" panose="020B0604020202020204" pitchFamily="34" charset="0"/>
-              </a:endParaRPr>
-            </a:p>
-            <a:p>
-              <a:r>
-                <a:rPr lang="en-US" sz="1400">
-                  <a:solidFill>
-                    <a:schemeClr val="accent2">
-                      <a:lumMod val="50000"/>
-                    </a:schemeClr>
-                  </a:solidFill>
-                  <a:latin typeface="Arial" panose="020B0604020202020204" pitchFamily="34" charset="0"/>
-                  <a:cs typeface="Arial" panose="020B0604020202020204" pitchFamily="34" charset="0"/>
-                </a:rPr>
-                <a:t>Danh_sach_Rap</a:t>
-              </a:r>
-              <a:r>
-                <a:rPr lang="en-US" sz="1400" i="1">
-                  <a:latin typeface="Arial" panose="020B0604020202020204" pitchFamily="34" charset="0"/>
-                  <a:cs typeface="Arial" panose="020B0604020202020204" pitchFamily="34" charset="0"/>
-                </a:rPr>
-                <a:t> : </a:t>
-              </a:r>
-              <a:r>
-                <a:rPr lang="en-US" sz="1400">
-                  <a:latin typeface="Arial" panose="020B0604020202020204" pitchFamily="34" charset="0"/>
-                  <a:cs typeface="Arial" panose="020B0604020202020204" pitchFamily="34" charset="0"/>
-                </a:rPr>
-                <a:t>Ten,Ma_so, Danh_sach_Phong_chieu</a:t>
-              </a:r>
-              <a:endParaRPr lang="en-US" sz="1400">
-                <a:latin typeface="Arial" panose="020B0604020202020204" pitchFamily="34" charset="0"/>
-                <a:cs typeface="Arial" panose="020B0604020202020204" pitchFamily="34" charset="0"/>
-              </a:endParaRPr>
-            </a:p>
-          </p:txBody>
-        </p:sp>
-      </p:grpSp>
-      <p:grpSp>
-        <p:nvGrpSpPr>
-          <p:cNvPr id="7" name="Group 6"/>
-          <p:cNvGrpSpPr/>
+              <a:latin typeface="Arial" panose="020B0604020202020204" pitchFamily="34" charset="0"/>
+              <a:cs typeface="Arial" panose="020B0604020202020204" pitchFamily="34" charset="0"/>
+            </a:endParaRPr>
+          </a:p>
+        </p:txBody>
+      </p:sp>
+      <p:sp>
+        <p:nvSpPr>
+          <p:cNvPr id="12" name="Text Box 11"/>
+          <p:cNvSpPr txBox="1"/>
           <p:nvPr/>
-        </p:nvGrpSpPr>
-        <p:grpSpPr>
-          <a:xfrm>
-            <a:off x="-11662" y="2205997"/>
-            <a:ext cx="5173080" cy="1506954"/>
-            <a:chOff x="903567" y="2937671"/>
-            <a:chExt cx="1767100" cy="1506954"/>
-          </a:xfrm>
-        </p:grpSpPr>
-        <p:sp>
-          <p:nvSpPr>
-            <p:cNvPr id="8" name="TextBox 28"/>
-            <p:cNvSpPr txBox="1"/>
-            <p:nvPr/>
-          </p:nvSpPr>
-          <p:spPr>
-            <a:xfrm>
-              <a:off x="903567" y="2937671"/>
-              <a:ext cx="1767100" cy="337185"/>
-            </a:xfrm>
-            <a:prstGeom prst="rect">
-              <a:avLst/>
-            </a:prstGeom>
-            <a:noFill/>
-            <a:ln>
-              <a:solidFill>
-                <a:schemeClr val="tx1"/>
-              </a:solidFill>
-            </a:ln>
-          </p:spPr>
-          <p:txBody>
-            <a:bodyPr wrap="square" rtlCol="0">
-              <a:spAutoFit/>
-            </a:bodyPr>
-            <a:lstStyle/>
-            <a:p>
-              <a:pPr algn="ctr"/>
-              <a:r>
-                <a:rPr lang="en-US" sz="1600" b="1">
-                  <a:solidFill>
-                    <a:srgbClr val="002060"/>
-                  </a:solidFill>
-                  <a:latin typeface="Arial" panose="020B0604020202020204" pitchFamily="34" charset="0"/>
-                  <a:cs typeface="Arial" panose="020B0604020202020204" pitchFamily="34" charset="0"/>
-                </a:rPr>
-                <a:t>XL_PHIM  </a:t>
-              </a:r>
-              <a:endParaRPr lang="en-US" sz="1600" b="1">
-                <a:latin typeface="Arial" panose="020B0604020202020204" pitchFamily="34" charset="0"/>
-                <a:cs typeface="Arial" panose="020B0604020202020204" pitchFamily="34" charset="0"/>
-              </a:endParaRPr>
-            </a:p>
-          </p:txBody>
-        </p:sp>
-        <p:sp>
-          <p:nvSpPr>
-            <p:cNvPr id="9" name="TextBox 29"/>
-            <p:cNvSpPr txBox="1"/>
-            <p:nvPr/>
-          </p:nvSpPr>
-          <p:spPr>
-            <a:xfrm>
-              <a:off x="903567" y="3276225"/>
-              <a:ext cx="1767100" cy="1168400"/>
-            </a:xfrm>
-            <a:prstGeom prst="rect">
-              <a:avLst/>
-            </a:prstGeom>
-            <a:noFill/>
-            <a:ln>
-              <a:solidFill>
-                <a:schemeClr val="tx1"/>
-              </a:solidFill>
-            </a:ln>
-          </p:spPr>
-          <p:txBody>
-            <a:bodyPr wrap="square" rtlCol="0">
-              <a:spAutoFit/>
-            </a:bodyPr>
-            <a:lstStyle/>
-            <a:p>
-              <a:r>
-                <a:rPr lang="en-US" sz="1400">
-                  <a:latin typeface="Arial" panose="020B0604020202020204" pitchFamily="34" charset="0"/>
-                  <a:cs typeface="Arial" panose="020B0604020202020204" pitchFamily="34" charset="0"/>
-                </a:rPr>
-                <a:t>Ten,Ma_so,Ten_tieng_Anh,Don_gia,Trang_thai,Thoi_luong,Rating,Phan_loai,Quoc_gia,Dao_dien,Nha_san_xuat,The_loai,Dien_vien,Khoi_chieu.Noi_dung,Dich_thuat,</a:t>
-              </a:r>
-              <a:endParaRPr lang="en-US" sz="1400">
-                <a:latin typeface="Arial" panose="020B0604020202020204" pitchFamily="34" charset="0"/>
-                <a:cs typeface="Arial" panose="020B0604020202020204" pitchFamily="34" charset="0"/>
-              </a:endParaRPr>
-            </a:p>
-            <a:p>
-              <a:r>
-                <a:rPr lang="en-US" sz="1400">
-                  <a:solidFill>
-                    <a:srgbClr val="FF0000"/>
-                  </a:solidFill>
-                  <a:latin typeface="Arial" panose="020B0604020202020204" pitchFamily="34" charset="0"/>
-                  <a:cs typeface="Arial" panose="020B0604020202020204" pitchFamily="34" charset="0"/>
-                </a:rPr>
-                <a:t>Danh_sach_Suat_chieu: </a:t>
-              </a:r>
-              <a:r>
-                <a:rPr lang="en-US" sz="1400">
-                  <a:solidFill>
-                    <a:schemeClr val="tx1"/>
-                  </a:solidFill>
-                  <a:latin typeface="Arial" panose="020B0604020202020204" pitchFamily="34" charset="0"/>
-                  <a:cs typeface="Arial" panose="020B0604020202020204" pitchFamily="34" charset="0"/>
-                </a:rPr>
-                <a:t>Ma_so, Bat_dau, Danh_sach_Ghe_trong, Rap, Phong_chieu</a:t>
-              </a:r>
-              <a:endParaRPr lang="en-US" sz="1400">
+        </p:nvSpPr>
+        <p:spPr>
+          <a:xfrm>
+            <a:off x="533400" y="1442720"/>
+            <a:ext cx="3455670" cy="2306955"/>
+          </a:xfrm>
+          <a:prstGeom prst="rect">
+            <a:avLst/>
+          </a:prstGeom>
+          <a:noFill/>
+        </p:spPr>
+        <p:txBody>
+          <a:bodyPr wrap="square" rtlCol="0">
+            <a:spAutoFit/>
+          </a:bodyPr>
+          <a:p>
+            <a:r>
+              <a:rPr lang="en-US">
+                <a:sym typeface="+mn-ea"/>
+              </a:rPr>
+              <a:t>Dữ liệu được truyền từ dịch vụ dữ liệu và lưu trữ bao gồm:</a:t>
+            </a:r>
+            <a:endParaRPr lang="en-US"/>
+          </a:p>
+          <a:p>
+            <a:r>
+              <a:rPr lang="en-US">
+                <a:sym typeface="+mn-ea"/>
+              </a:rPr>
+              <a:t>Cong_ty</a:t>
+            </a:r>
+            <a:endParaRPr lang="en-US"/>
+          </a:p>
+          <a:p>
+            <a:r>
+              <a:rPr lang="en-US">
+                <a:sym typeface="+mn-ea"/>
+              </a:rPr>
+              <a:t>Danh_sach_Phim (không truyền Danh_sach_Dat_ve, Danh_sach_Ban_ve)</a:t>
+            </a:r>
+            <a:endParaRPr lang="en-US"/>
+          </a:p>
+          <a:p>
+            <a:r>
+              <a:rPr lang="en-US">
+                <a:sym typeface="+mn-ea"/>
+              </a:rPr>
+              <a:t>Danh_sach_Nguoi_dung_Noi_bo</a:t>
+            </a:r>
+            <a:endParaRPr lang="en-US"/>
+          </a:p>
+          <a:p>
+            <a:endParaRPr lang="en-US"/>
+          </a:p>
+        </p:txBody>
+      </p:sp>
+    </p:spTree>
+  </p:cSld>
+  <p:clrMapOvr>
+    <a:masterClrMapping/>
+  </p:clrMapOvr>
+</p:sld>
+</file>
+
+<file path=ppt/slides/slide7.xml><?xml version="1.0" encoding="utf-8"?>
+<p:sld xmlns:a="http://schemas.openxmlformats.org/drawingml/2006/main" xmlns:r="http://schemas.openxmlformats.org/officeDocument/2006/relationships" xmlns:p="http://schemas.openxmlformats.org/presentationml/2006/main">
+  <p:cSld>
+    <p:spTree>
+      <p:nvGrpSpPr>
+        <p:cNvPr id="1" name=""/>
+        <p:cNvGrpSpPr/>
+        <p:nvPr/>
+      </p:nvGrpSpPr>
+      <p:grpSpPr/>
+      <p:sp>
+        <p:nvSpPr>
+          <p:cNvPr id="69" name="Rounded Rectangle 68">
+            <a:hlinkClick r:id="rId1" action="ppaction://hlinksldjump"/>
+          </p:cNvPr>
+          <p:cNvSpPr/>
+          <p:nvPr/>
+        </p:nvSpPr>
+        <p:spPr>
+          <a:xfrm>
+            <a:off x="2232941" y="256387"/>
+            <a:ext cx="6074929" cy="754401"/>
+          </a:xfrm>
+          <a:prstGeom prst="roundRect">
+            <a:avLst/>
+          </a:prstGeom>
+          <a:solidFill>
+            <a:srgbClr val="002060"/>
+          </a:solidFill>
+          <a:ln w="38100" cap="rnd">
+            <a:solidFill>
+              <a:schemeClr val="bg1"/>
+            </a:solidFill>
+          </a:ln>
+          <a:effectLst>
+            <a:outerShdw blurRad="482600" dir="5400000" sx="89000" sy="89000" algn="ctr" rotWithShape="0">
+              <a:srgbClr val="000000">
+                <a:alpha val="49000"/>
+              </a:srgbClr>
+            </a:outerShdw>
+          </a:effectLst>
+          <a:scene3d>
+            <a:camera prst="orthographicFront"/>
+            <a:lightRig rig="twoPt" dir="t"/>
+          </a:scene3d>
+          <a:sp3d extrusionH="12700" prstMaterial="translucentPowder">
+            <a:bevelB w="165100" prst="coolSlant"/>
+          </a:sp3d>
+        </p:spPr>
+        <p:style>
+          <a:lnRef idx="2">
+            <a:schemeClr val="accent1">
+              <a:shade val="50000"/>
+            </a:schemeClr>
+          </a:lnRef>
+          <a:fillRef idx="1">
+            <a:schemeClr val="accent1"/>
+          </a:fillRef>
+          <a:effectRef idx="0">
+            <a:schemeClr val="accent1"/>
+          </a:effectRef>
+          <a:fontRef idx="minor">
+            <a:schemeClr val="lt1"/>
+          </a:fontRef>
+        </p:style>
+        <p:txBody>
+          <a:bodyPr rtlCol="0" anchor="ctr"/>
+          <a:p>
+            <a:pPr algn="ctr"/>
+            <a:r>
+              <a:rPr lang="en-US" sz="1600" b="1">
+                <a:solidFill>
+                  <a:prstClr val="white"/>
+                </a:solidFill>
                 <a:latin typeface="Arial" panose="020B0604020202020204" pitchFamily="34" charset="0"/>
                 <a:cs typeface="Arial" panose="020B0604020202020204" pitchFamily="34" charset="0"/>
                 <a:sym typeface="+mn-ea"/>
-              </a:endParaRPr>
-            </a:p>
-          </p:txBody>
-        </p:sp>
-      </p:grpSp>
+              </a:rPr>
+              <a:t>Công ty Galaxy Cinema </a:t>
+            </a:r>
+            <a:r>
+              <a:rPr lang="en-US" sz="1600">
+                <a:solidFill>
+                  <a:prstClr val="white"/>
+                </a:solidFill>
+                <a:latin typeface="Arial" panose="020B0604020202020204" pitchFamily="34" charset="0"/>
+                <a:cs typeface="Arial" panose="020B0604020202020204" pitchFamily="34" charset="0"/>
+                <a:sym typeface="+mn-ea"/>
+              </a:rPr>
+              <a:t>( Mã số : </a:t>
+            </a:r>
+            <a:r>
+              <a:rPr lang="en-US" sz="1600">
+                <a:solidFill>
+                  <a:schemeClr val="bg1"/>
+                </a:solidFill>
+                <a:latin typeface="Arial" panose="020B0604020202020204" pitchFamily="34" charset="0"/>
+                <a:cs typeface="Arial" panose="020B0604020202020204" pitchFamily="34" charset="0"/>
+                <a:sym typeface="+mn-ea"/>
+              </a:rPr>
+              <a:t>Galaxy_Cinema</a:t>
+            </a:r>
+            <a:r>
+              <a:rPr lang="en-US" sz="1600">
+                <a:solidFill>
+                  <a:prstClr val="white"/>
+                </a:solidFill>
+                <a:latin typeface="Arial" panose="020B0604020202020204" pitchFamily="34" charset="0"/>
+                <a:cs typeface="Arial" panose="020B0604020202020204" pitchFamily="34" charset="0"/>
+                <a:sym typeface="+mn-ea"/>
+              </a:rPr>
+              <a:t>)</a:t>
+            </a:r>
+            <a:endParaRPr lang="en-US" sz="1600">
+              <a:solidFill>
+                <a:prstClr val="white"/>
+              </a:solidFill>
+              <a:latin typeface="Arial" panose="020B0604020202020204" pitchFamily="34" charset="0"/>
+              <a:cs typeface="Arial" panose="020B0604020202020204" pitchFamily="34" charset="0"/>
+            </a:endParaRPr>
+          </a:p>
+          <a:p>
+            <a:pPr algn="ctr"/>
+            <a:r>
+              <a:rPr lang="en-US" sz="1600" b="1">
+                <a:solidFill>
+                  <a:srgbClr val="FFFF00"/>
+                </a:solidFill>
+                <a:latin typeface="Arial" panose="020B0604020202020204" pitchFamily="34" charset="0"/>
+                <a:cs typeface="Arial" panose="020B0604020202020204" pitchFamily="34" charset="0"/>
+                <a:sym typeface="+mn-ea"/>
+              </a:rPr>
+              <a:t>3-B Xử lý  </a:t>
+            </a:r>
+            <a:endParaRPr lang="vi-VN" sz="1600">
+              <a:solidFill>
+                <a:srgbClr val="FFFF00"/>
+              </a:solidFill>
+              <a:latin typeface="Arial" panose="020B0604020202020204" pitchFamily="34" charset="0"/>
+              <a:cs typeface="Arial" panose="020B0604020202020204" pitchFamily="34" charset="0"/>
+            </a:endParaRPr>
+          </a:p>
+        </p:txBody>
+      </p:sp>
+      <p:sp>
+        <p:nvSpPr>
+          <p:cNvPr id="4" name="Text Box 3"/>
+          <p:cNvSpPr txBox="1"/>
+          <p:nvPr/>
+        </p:nvSpPr>
+        <p:spPr>
+          <a:xfrm>
+            <a:off x="7007225" y="1216025"/>
+            <a:ext cx="5014595" cy="675640"/>
+          </a:xfrm>
+          <a:prstGeom prst="rect">
+            <a:avLst/>
+          </a:prstGeom>
+          <a:noFill/>
+        </p:spPr>
+        <p:txBody>
+          <a:bodyPr wrap="square" rtlCol="0">
+            <a:spAutoFit/>
+          </a:bodyPr>
+          <a:p>
+            <a:r>
+              <a:rPr lang="en-US" sz="1400" b="1"/>
+              <a:t>XL_DU_LIEU</a:t>
+            </a:r>
+            <a:endParaRPr lang="en-US" sz="1400" b="1"/>
+          </a:p>
+          <a:p>
+            <a:r>
+              <a:rPr lang="en-US" sz="1200"/>
+              <a:t>Doc_du_lieu: hàm đọc dữ liệu từ dịch vụ dữ liệu và media</a:t>
+            </a:r>
+            <a:endParaRPr lang="en-US" sz="1200"/>
+          </a:p>
+          <a:p>
+            <a:r>
+              <a:rPr lang="en-US" sz="1200"/>
+              <a:t>Ghi_Dat_Ve_moi: Hàm ghi phiếu đặt vé mới lên dịch vụ dữ liệu và media</a:t>
+            </a:r>
+            <a:endParaRPr lang="en-US" sz="1200"/>
+          </a:p>
+        </p:txBody>
+      </p:sp>
+      <p:sp>
+        <p:nvSpPr>
+          <p:cNvPr id="5" name="Text Box 4"/>
+          <p:cNvSpPr txBox="1"/>
+          <p:nvPr/>
+        </p:nvSpPr>
+        <p:spPr>
+          <a:xfrm>
+            <a:off x="198120" y="1114425"/>
+            <a:ext cx="7699375" cy="5477510"/>
+          </a:xfrm>
+          <a:prstGeom prst="rect">
+            <a:avLst/>
+          </a:prstGeom>
+          <a:noFill/>
+        </p:spPr>
+        <p:txBody>
+          <a:bodyPr wrap="square" rtlCol="0">
+            <a:spAutoFit/>
+          </a:bodyPr>
+          <a:p>
+            <a:r>
+              <a:rPr lang="en-US" sz="1400" b="1"/>
+              <a:t>XL_UNG_DUNG</a:t>
+            </a:r>
+            <a:endParaRPr lang="en-US" sz="1400" b="1"/>
+          </a:p>
+          <a:p>
+            <a:r>
+              <a:rPr lang="en-US" sz="1200" i="1"/>
+              <a:t>// M+ (Model for All )</a:t>
+            </a:r>
+            <a:r>
+              <a:rPr lang="en-US" sz="1200"/>
+              <a:t> </a:t>
+            </a:r>
+            <a:endParaRPr lang="en-US" sz="1200"/>
+          </a:p>
+          <a:p>
+            <a:r>
+              <a:rPr lang="en-US" sz="1200"/>
+              <a:t>Khoi_dong_Ung_dung: khởi động dữ liệu cho ứng dụng</a:t>
+            </a:r>
+            <a:endParaRPr lang="en-US" sz="1200"/>
+          </a:p>
+          <a:p>
+            <a:r>
+              <a:rPr lang="en-US" sz="1200"/>
+              <a:t>//Xử lý Chức năng của Khách Tham quan :</a:t>
+            </a:r>
+            <a:endParaRPr lang="en-US" sz="1200"/>
+          </a:p>
+          <a:p>
+            <a:r>
+              <a:rPr lang="en-US" sz="1200"/>
+              <a:t>Khoi_dong_MH_chinh: Gọi các hàm xử lý và tạo giao diện bàn đầu cho MH_chinh ( hàm </a:t>
+            </a:r>
+            <a:r>
+              <a:rPr lang="en-US" sz="1200">
+                <a:sym typeface="+mn-ea"/>
+              </a:rPr>
+              <a:t>Tao_Chuoi_HTML_Xem_Man_hinh_Chinh)</a:t>
+            </a:r>
+            <a:endParaRPr lang="en-US" sz="1200"/>
+          </a:p>
+          <a:p>
+            <a:r>
+              <a:rPr lang="en-US" sz="1200"/>
+              <a:t>Dang_nhap: Hàm đăng nhập các phân hệ khác từ phân hệ khách tham quan</a:t>
+            </a:r>
+            <a:endParaRPr lang="en-US" sz="1200"/>
+          </a:p>
+          <a:p>
+            <a:r>
+              <a:rPr lang="en-US" sz="1200"/>
+              <a:t>Xem_Danh_sach_Phim_dang_chieu: Gọi hàm tạo chuỗi html danh sách phim đang chiếu</a:t>
+            </a:r>
+            <a:endParaRPr lang="en-US" sz="1200"/>
+          </a:p>
+          <a:p>
+            <a:r>
+              <a:rPr lang="en-US" sz="1200"/>
+              <a:t>Tra_cuu: xử lý chức năng tra cứu từ khung tra cứu, trả về chuỗi html tạo từ hàm </a:t>
+            </a:r>
+            <a:r>
+              <a:rPr lang="en-US" sz="1200">
+                <a:sym typeface="+mn-ea"/>
+              </a:rPr>
+              <a:t>Tao_chuoi_HTML_Xem</a:t>
+            </a:r>
+            <a:endParaRPr lang="en-US" sz="1200"/>
+          </a:p>
+          <a:p>
+            <a:r>
+              <a:rPr lang="en-US" sz="1200"/>
+              <a:t>Chon_Phim: </a:t>
+            </a:r>
+            <a:r>
+              <a:rPr lang="en-US" sz="1200">
+                <a:sym typeface="+mn-ea"/>
+              </a:rPr>
+              <a:t>xử lý chức năng chọn phim, chuyển sang trang chi tiết phim</a:t>
+            </a:r>
+            <a:endParaRPr lang="en-US" sz="1200"/>
+          </a:p>
+          <a:p>
+            <a:r>
+              <a:rPr lang="en-US" sz="1200"/>
+              <a:t>Tao_Chuoi_HTML_Xem_Man_hinh_Chinh: gọi các hàm tạo chuỗi xem cho giao diện màn hình chính</a:t>
+            </a:r>
+            <a:endParaRPr lang="en-US" sz="1200"/>
+          </a:p>
+          <a:p>
+            <a:r>
+              <a:rPr lang="en-US" sz="1200"/>
+              <a:t>Khoi_dong_Man_hinh_Chi_tiet_Phim: </a:t>
+            </a:r>
+            <a:r>
+              <a:rPr lang="en-US" sz="1200">
+                <a:sym typeface="+mn-ea"/>
+              </a:rPr>
+              <a:t>Gọi các hàm xử lý và tạo giao diện ban đầu cho MH_chi_tiet_Phim</a:t>
+            </a:r>
+            <a:endParaRPr lang="en-US" sz="1200">
+              <a:sym typeface="+mn-ea"/>
+            </a:endParaRPr>
+          </a:p>
+          <a:p>
+            <a:r>
+              <a:rPr lang="en-US" sz="1200">
+                <a:sym typeface="+mn-ea"/>
+              </a:rPr>
+              <a:t>Tao_Chuoi_HTML_Chi_tiet_Phim: gọi các hàm tạo chuỗi xem cho giao diện màn hình chi tiết phim</a:t>
+            </a:r>
+            <a:endParaRPr lang="en-US" sz="1200">
+              <a:sym typeface="+mn-ea"/>
+            </a:endParaRPr>
+          </a:p>
+          <a:p>
+            <a:r>
+              <a:rPr lang="en-US" sz="1200">
+                <a:sym typeface="+mn-ea"/>
+              </a:rPr>
+              <a:t>Khoi_dong_Man_hinh_Chon_Ghe: </a:t>
+            </a:r>
+            <a:r>
+              <a:rPr lang="en-US" sz="1200">
+                <a:sym typeface="+mn-ea"/>
+              </a:rPr>
+              <a:t>Gọi các hàm xử lý và tạo giao diện ban đầu cho MH_</a:t>
+            </a:r>
+            <a:r>
+              <a:rPr lang="en-US" sz="1200">
+                <a:sym typeface="+mn-ea"/>
+              </a:rPr>
+              <a:t>Chon_Ghe</a:t>
+            </a:r>
+            <a:endParaRPr lang="en-US" sz="1200">
+              <a:sym typeface="+mn-ea"/>
+            </a:endParaRPr>
+          </a:p>
+          <a:p>
+            <a:r>
+              <a:rPr lang="en-US" sz="1200">
+                <a:sym typeface="+mn-ea"/>
+              </a:rPr>
+              <a:t>Tao_Chuoi_Danh_sach_Ghe: Hàm xử lý trạng thái ghế sau đó gọi hàm  </a:t>
+            </a:r>
+            <a:r>
+              <a:rPr lang="en-US" sz="1200">
+                <a:sym typeface="+mn-ea"/>
+              </a:rPr>
+              <a:t>Tao_chuoi_HTML_Ghe</a:t>
+            </a:r>
+            <a:endParaRPr lang="en-US" sz="1200">
+              <a:sym typeface="+mn-ea"/>
+            </a:endParaRPr>
+          </a:p>
+          <a:p>
+            <a:r>
+              <a:rPr lang="en-US" sz="1200">
+                <a:sym typeface="+mn-ea"/>
+              </a:rPr>
+              <a:t>Tao_chuoi_HTML_Man_hinh_Chon_Ghe: </a:t>
+            </a:r>
+            <a:r>
+              <a:rPr lang="en-US" sz="1200">
+                <a:sym typeface="+mn-ea"/>
+              </a:rPr>
+              <a:t>gọi các hàm tạo chuỗi xem cho giao diện màn hình chọn ghế</a:t>
+            </a:r>
+            <a:endParaRPr lang="en-US" sz="1200">
+              <a:sym typeface="+mn-ea"/>
+            </a:endParaRPr>
+          </a:p>
+          <a:p>
+            <a:r>
+              <a:rPr lang="en-US" sz="1200">
+                <a:sym typeface="+mn-ea"/>
+              </a:rPr>
+              <a:t>Tao_chuoi_HTML_Man_hinh_Thong_tin_Ca_nhan</a:t>
+            </a:r>
+            <a:r>
+              <a:rPr lang="en-US" sz="1200">
+                <a:sym typeface="+mn-ea"/>
+              </a:rPr>
+              <a:t>: gọi các hàm tạo chuỗi xem cho giao diện màn hình thông tin cá nhân</a:t>
+            </a:r>
+            <a:endParaRPr lang="en-US" sz="1200">
+              <a:sym typeface="+mn-ea"/>
+            </a:endParaRPr>
+          </a:p>
+          <a:p>
+            <a:r>
+              <a:rPr lang="en-US" sz="1200">
+                <a:sym typeface="+mn-ea"/>
+              </a:rPr>
+              <a:t>Dat_ve: xử lý chức năng đặt chỗ</a:t>
+            </a:r>
+            <a:r>
+              <a:rPr lang="en-US" sz="1200"/>
+              <a:t> </a:t>
+            </a:r>
+            <a:endParaRPr lang="en-US" sz="1200"/>
+          </a:p>
+          <a:p>
+            <a:r>
+              <a:rPr lang="en-US" sz="1200" i="1"/>
+              <a:t>//View-Layers/Prsenetaition VL/PL</a:t>
+            </a:r>
+            <a:endParaRPr lang="en-US" sz="1200" i="1"/>
+          </a:p>
+          <a:p>
+            <a:r>
+              <a:rPr lang="en-US" sz="1200"/>
+              <a:t>Tao_Chuoi_HTML_Danh_sach_Phim_Xem: Hàm tạo chuỗi html từ Danh_sach_Mon_an_Xem của khách tham quan.</a:t>
+            </a:r>
+            <a:endParaRPr lang="en-US" sz="1200"/>
+          </a:p>
+          <a:p>
+            <a:r>
+              <a:rPr lang="en-US" sz="1200">
+                <a:sym typeface="+mn-ea"/>
+              </a:rPr>
+              <a:t>Tao_Chuoi_Chi_tiet_Phim: tạo chuỗi html thông tin chi tiết phim</a:t>
+            </a:r>
+            <a:endParaRPr lang="en-US" sz="1200">
+              <a:sym typeface="+mn-ea"/>
+            </a:endParaRPr>
+          </a:p>
+          <a:p>
+            <a:r>
+              <a:rPr lang="en-US" sz="1200">
+                <a:sym typeface="+mn-ea"/>
+              </a:rPr>
+              <a:t>Tao_Chuoi_Suat_chieu: tạo chuỗi thể hiện các suất chiến để người dùng chọn</a:t>
+            </a:r>
+            <a:endParaRPr lang="en-US" sz="1200">
+              <a:sym typeface="+mn-ea"/>
+            </a:endParaRPr>
+          </a:p>
+          <a:p>
+            <a:r>
+              <a:rPr lang="en-US" sz="1200">
+                <a:sym typeface="+mn-ea"/>
+              </a:rPr>
+              <a:t>Tao_chuoi_HTML_Ghe: tạo chuỗi html cho 1 ghế tùy theo tình trạng</a:t>
+            </a:r>
+            <a:endParaRPr lang="en-US" sz="1200">
+              <a:sym typeface="+mn-ea"/>
+            </a:endParaRPr>
+          </a:p>
+          <a:p>
+            <a:r>
+              <a:rPr lang="en-US" sz="1200">
+                <a:sym typeface="+mn-ea"/>
+              </a:rPr>
+              <a:t>Tao_Bang_Thong_tin_Ve: tạo chuỗi html thể hiện bảng thông tin vé trong MH_Chon_Ghe và MH_Thong_tin_Ca_nhan</a:t>
+            </a:r>
+            <a:endParaRPr lang="en-US" sz="1200">
+              <a:sym typeface="+mn-ea"/>
+            </a:endParaRPr>
+          </a:p>
+          <a:p>
+            <a:r>
+              <a:rPr lang="en-US" sz="1200">
+                <a:sym typeface="+mn-ea"/>
+              </a:rPr>
+              <a:t>Tao_chuoi_Nhap_Thong_tin_Ca_nhan: tạo chuỗi html để nhập thông tin cá nhân</a:t>
+            </a:r>
+            <a:endParaRPr lang="en-US" sz="1200">
+              <a:sym typeface="+mn-ea"/>
+            </a:endParaRPr>
+          </a:p>
+          <a:p>
+            <a:r>
+              <a:rPr lang="en-US" sz="1200" i="1">
+                <a:sym typeface="+mn-ea"/>
+              </a:rPr>
+              <a:t>//Business-Layers BL</a:t>
+            </a:r>
+            <a:endParaRPr lang="en-US" sz="1200" i="1">
+              <a:sym typeface="+mn-ea"/>
+            </a:endParaRPr>
+          </a:p>
+          <a:p>
+            <a:r>
+              <a:rPr lang="en-US" sz="1200">
+                <a:sym typeface="+mn-ea"/>
+              </a:rPr>
+              <a:t>Tra_cuu_Phim : Hàm tra cứu phim theo Tên</a:t>
+            </a:r>
+            <a:endParaRPr lang="en-US" sz="1200">
+              <a:sym typeface="+mn-ea"/>
+            </a:endParaRPr>
+          </a:p>
+          <a:p>
+            <a:r>
+              <a:rPr lang="en-US" sz="1200">
+                <a:sym typeface="+mn-ea"/>
+              </a:rPr>
+              <a:t>Tim_Phim: Hàm tìm phim theo mã số</a:t>
+            </a:r>
+            <a:endParaRPr lang="en-US" sz="1200">
+              <a:sym typeface="+mn-ea"/>
+            </a:endParaRPr>
+          </a:p>
+          <a:p>
+            <a:r>
+              <a:rPr lang="en-US" sz="1200"/>
+              <a:t>Tim_Suat_chieu: Hàm tìm suất chiếu theo mã số</a:t>
+            </a:r>
+            <a:endParaRPr lang="en-US" sz="1200"/>
+          </a:p>
+        </p:txBody>
+      </p:sp>
     </p:spTree>
   </p:cSld>
   <p:clrMapOvr>

</xml_diff>